<commit_message>
Truncate last lecture slides to avoid repetition
</commit_message>
<xml_diff>
--- a/ex/553-S25/staging/553-S25/lectures/06-application-architecture.pptx
+++ b/ex/553-S25/staging/553-S25/lectures/06-application-architecture.pptx
@@ -5,7 +5,7 @@
     <p:sldMasterId id="2147483648" r:id="rId1"/>
   </p:sldMasterIdLst>
   <p:notesMasterIdLst>
-    <p:notesMasterId r:id="rId24"/>
+    <p:notesMasterId r:id="rId19"/>
   </p:notesMasterIdLst>
   <p:sldIdLst>
     <p:sldId id="1104" r:id="rId2"/>
@@ -25,11 +25,6 @@
     <p:sldId id="1184" r:id="rId16"/>
     <p:sldId id="1185" r:id="rId17"/>
     <p:sldId id="1170" r:id="rId18"/>
-    <p:sldId id="1173" r:id="rId19"/>
-    <p:sldId id="1160" r:id="rId20"/>
-    <p:sldId id="1180" r:id="rId21"/>
-    <p:sldId id="1186" r:id="rId22"/>
-    <p:sldId id="1174" r:id="rId23"/>
   </p:sldIdLst>
   <p:sldSz cx="12192000" cy="6858000"/>
   <p:notesSz cx="6858000" cy="9144000"/>
@@ -221,7 +216,7 @@
           <a:p>
             <a:fld id="{973C490B-630B-7F46-B6FE-05D0FD1689A8}" type="datetimeFigureOut">
               <a:rPr lang="en-US" smtClean="0"/>
-              <a:t>2/25/25</a:t>
+              <a:t>3/5/25</a:t>
             </a:fld>
             <a:endParaRPr lang="en-US"/>
           </a:p>
@@ -635,7 +630,7 @@
           <a:p>
             <a:fld id="{DEDCE603-2B12-5844-BEA7-E98E825B38C7}" type="datetimeFigureOut">
               <a:rPr lang="en-US" smtClean="0"/>
-              <a:t>2/25/25</a:t>
+              <a:t>3/5/25</a:t>
             </a:fld>
             <a:endParaRPr lang="en-US"/>
           </a:p>
@@ -833,7 +828,7 @@
           <a:p>
             <a:fld id="{DEDCE603-2B12-5844-BEA7-E98E825B38C7}" type="datetimeFigureOut">
               <a:rPr lang="en-US" smtClean="0"/>
-              <a:t>2/25/25</a:t>
+              <a:t>3/5/25</a:t>
             </a:fld>
             <a:endParaRPr lang="en-US"/>
           </a:p>
@@ -1041,7 +1036,7 @@
           <a:p>
             <a:fld id="{DEDCE603-2B12-5844-BEA7-E98E825B38C7}" type="datetimeFigureOut">
               <a:rPr lang="en-US" smtClean="0"/>
-              <a:t>2/25/25</a:t>
+              <a:t>3/5/25</a:t>
             </a:fld>
             <a:endParaRPr lang="en-US"/>
           </a:p>
@@ -1250,7 +1245,7 @@
           <a:p>
             <a:fld id="{DEDCE603-2B12-5844-BEA7-E98E825B38C7}" type="datetimeFigureOut">
               <a:rPr lang="en-US" smtClean="0"/>
-              <a:t>2/25/25</a:t>
+              <a:t>3/5/25</a:t>
             </a:fld>
             <a:endParaRPr lang="en-US"/>
           </a:p>
@@ -1525,7 +1520,7 @@
           <a:p>
             <a:fld id="{DEDCE603-2B12-5844-BEA7-E98E825B38C7}" type="datetimeFigureOut">
               <a:rPr lang="en-US" smtClean="0"/>
-              <a:t>2/25/25</a:t>
+              <a:t>3/5/25</a:t>
             </a:fld>
             <a:endParaRPr lang="en-US"/>
           </a:p>
@@ -1790,7 +1785,7 @@
           <a:p>
             <a:fld id="{DEDCE603-2B12-5844-BEA7-E98E825B38C7}" type="datetimeFigureOut">
               <a:rPr lang="en-US" smtClean="0"/>
-              <a:t>2/25/25</a:t>
+              <a:t>3/5/25</a:t>
             </a:fld>
             <a:endParaRPr lang="en-US"/>
           </a:p>
@@ -2202,7 +2197,7 @@
           <a:p>
             <a:fld id="{DEDCE603-2B12-5844-BEA7-E98E825B38C7}" type="datetimeFigureOut">
               <a:rPr lang="en-US" smtClean="0"/>
-              <a:t>2/25/25</a:t>
+              <a:t>3/5/25</a:t>
             </a:fld>
             <a:endParaRPr lang="en-US"/>
           </a:p>
@@ -2343,7 +2338,7 @@
           <a:p>
             <a:fld id="{DEDCE603-2B12-5844-BEA7-E98E825B38C7}" type="datetimeFigureOut">
               <a:rPr lang="en-US" smtClean="0"/>
-              <a:t>2/25/25</a:t>
+              <a:t>3/5/25</a:t>
             </a:fld>
             <a:endParaRPr lang="en-US"/>
           </a:p>
@@ -2456,7 +2451,7 @@
           <a:p>
             <a:fld id="{DEDCE603-2B12-5844-BEA7-E98E825B38C7}" type="datetimeFigureOut">
               <a:rPr lang="en-US" smtClean="0"/>
-              <a:t>2/25/25</a:t>
+              <a:t>3/5/25</a:t>
             </a:fld>
             <a:endParaRPr lang="en-US"/>
           </a:p>
@@ -2767,7 +2762,7 @@
           <a:p>
             <a:fld id="{DEDCE603-2B12-5844-BEA7-E98E825B38C7}" type="datetimeFigureOut">
               <a:rPr lang="en-US" smtClean="0"/>
-              <a:t>2/25/25</a:t>
+              <a:t>3/5/25</a:t>
             </a:fld>
             <a:endParaRPr lang="en-US"/>
           </a:p>
@@ -3055,7 +3050,7 @@
           <a:p>
             <a:fld id="{DEDCE603-2B12-5844-BEA7-E98E825B38C7}" type="datetimeFigureOut">
               <a:rPr lang="en-US" smtClean="0"/>
-              <a:t>2/25/25</a:t>
+              <a:t>3/5/25</a:t>
             </a:fld>
             <a:endParaRPr lang="en-US"/>
           </a:p>
@@ -3296,7 +3291,7 @@
           <a:p>
             <a:fld id="{DEDCE603-2B12-5844-BEA7-E98E825B38C7}" type="datetimeFigureOut">
               <a:rPr lang="en-US" smtClean="0"/>
-              <a:t>2/25/25</a:t>
+              <a:t>3/5/25</a:t>
             </a:fld>
             <a:endParaRPr lang="en-US"/>
           </a:p>
@@ -9369,1614 +9364,6 @@
 </p:sld>
 </file>
 
-<file path=ppt/slides/slide18.xml><?xml version="1.0" encoding="utf-8"?>
-<p:sld xmlns:a="http://schemas.openxmlformats.org/drawingml/2006/main" xmlns:r="http://schemas.openxmlformats.org/officeDocument/2006/relationships" xmlns:p="http://schemas.openxmlformats.org/presentationml/2006/main">
-  <p:cSld>
-    <p:spTree>
-      <p:nvGrpSpPr>
-        <p:cNvPr id="1" name=""/>
-        <p:cNvGrpSpPr/>
-        <p:nvPr/>
-      </p:nvGrpSpPr>
-      <p:grpSpPr>
-        <a:xfrm>
-          <a:off x="0" y="0"/>
-          <a:ext cx="0" cy="0"/>
-          <a:chOff x="0" y="0"/>
-          <a:chExt cx="0" cy="0"/>
-        </a:xfrm>
-      </p:grpSpPr>
-      <p:pic>
-        <p:nvPicPr>
-          <p:cNvPr id="4" name="Picture 3" descr="A diagram of a program&#10;&#10;AI-generated content may be incorrect.">
-            <a:extLst>
-              <a:ext uri="{FF2B5EF4-FFF2-40B4-BE49-F238E27FC236}">
-                <a16:creationId xmlns:a16="http://schemas.microsoft.com/office/drawing/2014/main" id="{A7C4F1ED-EA3F-AF42-CCB7-05EF074B2034}"/>
-              </a:ext>
-            </a:extLst>
-          </p:cNvPr>
-          <p:cNvPicPr>
-            <a:picLocks noChangeAspect="1"/>
-          </p:cNvPicPr>
-          <p:nvPr/>
-        </p:nvPicPr>
-        <p:blipFill>
-          <a:blip r:embed="rId2"/>
-          <a:stretch>
-            <a:fillRect/>
-          </a:stretch>
-        </p:blipFill>
-        <p:spPr>
-          <a:xfrm>
-            <a:off x="8941981" y="1"/>
-            <a:ext cx="3250019" cy="2204384"/>
-          </a:xfrm>
-          <a:prstGeom prst="rect">
-            <a:avLst/>
-          </a:prstGeom>
-        </p:spPr>
-      </p:pic>
-      <p:sp>
-        <p:nvSpPr>
-          <p:cNvPr id="2" name="Title 1">
-            <a:extLst>
-              <a:ext uri="{FF2B5EF4-FFF2-40B4-BE49-F238E27FC236}">
-                <a16:creationId xmlns:a16="http://schemas.microsoft.com/office/drawing/2014/main" id="{9C6F29FC-9433-7542-E6B9-18C4058C3C0B}"/>
-              </a:ext>
-            </a:extLst>
-          </p:cNvPr>
-          <p:cNvSpPr>
-            <a:spLocks noGrp="1"/>
-          </p:cNvSpPr>
-          <p:nvPr>
-            <p:ph type="title"/>
-          </p:nvPr>
-        </p:nvSpPr>
-        <p:spPr/>
-        <p:txBody>
-          <a:bodyPr/>
-          <a:lstStyle/>
-          <a:p>
-            <a:r>
-              <a:rPr lang="en-US" dirty="0"/>
-              <a:t>Processing steps in MapReduce</a:t>
-            </a:r>
-          </a:p>
-        </p:txBody>
-      </p:sp>
-      <p:sp>
-        <p:nvSpPr>
-          <p:cNvPr id="3" name="Content Placeholder 2">
-            <a:extLst>
-              <a:ext uri="{FF2B5EF4-FFF2-40B4-BE49-F238E27FC236}">
-                <a16:creationId xmlns:a16="http://schemas.microsoft.com/office/drawing/2014/main" id="{C8FC30C3-79CD-6999-56CF-1A9AC53395AF}"/>
-              </a:ext>
-            </a:extLst>
-          </p:cNvPr>
-          <p:cNvSpPr>
-            <a:spLocks noGrp="1"/>
-          </p:cNvSpPr>
-          <p:nvPr>
-            <p:ph idx="1"/>
-          </p:nvPr>
-        </p:nvSpPr>
-        <p:spPr>
-          <a:xfrm>
-            <a:off x="838200" y="1825625"/>
-            <a:ext cx="10515600" cy="4821360"/>
-          </a:xfrm>
-        </p:spPr>
-        <p:txBody>
-          <a:bodyPr>
-            <a:normAutofit fontScale="92500" lnSpcReduction="10000"/>
-          </a:bodyPr>
-          <a:lstStyle/>
-          <a:p>
-            <a:r>
-              <a:rPr lang="en-US" dirty="0"/>
-              <a:t>Input data consumed from a distributed filesystem</a:t>
-            </a:r>
-          </a:p>
-          <a:p>
-            <a:r>
-              <a:rPr lang="en-US" dirty="0"/>
-              <a:t>Master ships code to the worker node closest to data, if possible (CPU, memory constraints permitting)</a:t>
-            </a:r>
-          </a:p>
-          <a:p>
-            <a:r>
-              <a:rPr lang="en-US" dirty="0"/>
-              <a:t>Each mapper partitions its input data by the reducer key </a:t>
-            </a:r>
-          </a:p>
-          <a:p>
-            <a:pPr lvl="1"/>
-            <a:r>
-              <a:rPr lang="en-US" dirty="0"/>
-              <a:t>Typically through a hash function, e.g., hash (key) mod R == r</a:t>
-            </a:r>
-          </a:p>
-          <a:p>
-            <a:r>
-              <a:rPr lang="en-US" dirty="0"/>
-              <a:t>Sort output data (per partition) by the key; run map function</a:t>
-            </a:r>
-          </a:p>
-          <a:p>
-            <a:r>
-              <a:rPr lang="en-US" dirty="0"/>
-              <a:t>Reducers are informed of partial result at each mapper</a:t>
-            </a:r>
-          </a:p>
-          <a:p>
-            <a:r>
-              <a:rPr lang="en-US" dirty="0"/>
-              <a:t>Reducer pulls files from mappers through RPC</a:t>
-            </a:r>
-          </a:p>
-          <a:p>
-            <a:r>
-              <a:rPr lang="en-US" dirty="0"/>
-              <a:t>Output persisted to distributed filesystem (typically involves replication)</a:t>
-            </a:r>
-          </a:p>
-          <a:p>
-            <a:r>
-              <a:rPr lang="en-US" dirty="0"/>
-              <a:t>Result: R output files in the DFS (one per reducer partition)</a:t>
-            </a:r>
-          </a:p>
-        </p:txBody>
-      </p:sp>
-    </p:spTree>
-    <p:extLst>
-      <p:ext uri="{BB962C8B-B14F-4D97-AF65-F5344CB8AC3E}">
-        <p14:creationId xmlns:p14="http://schemas.microsoft.com/office/powerpoint/2010/main" val="85706473"/>
-      </p:ext>
-    </p:extLst>
-  </p:cSld>
-  <p:clrMapOvr>
-    <a:masterClrMapping/>
-  </p:clrMapOvr>
-  <p:timing>
-    <p:tnLst>
-      <p:par>
-        <p:cTn id="1" dur="indefinite" restart="never" nodeType="tmRoot">
-          <p:childTnLst>
-            <p:seq concurrent="1" nextAc="seek">
-              <p:cTn id="2" dur="indefinite" nodeType="mainSeq">
-                <p:childTnLst>
-                  <p:par>
-                    <p:cTn id="3" fill="hold">
-                      <p:stCondLst>
-                        <p:cond delay="indefinite"/>
-                      </p:stCondLst>
-                      <p:childTnLst>
-                        <p:par>
-                          <p:cTn id="4" fill="hold">
-                            <p:stCondLst>
-                              <p:cond delay="0"/>
-                            </p:stCondLst>
-                            <p:childTnLst>
-                              <p:par>
-                                <p:cTn id="5" presetID="1" presetClass="entr" presetSubtype="0" fill="hold" nodeType="clickEffect">
-                                  <p:stCondLst>
-                                    <p:cond delay="0"/>
-                                  </p:stCondLst>
-                                  <p:childTnLst>
-                                    <p:set>
-                                      <p:cBhvr>
-                                        <p:cTn id="6" dur="1" fill="hold">
-                                          <p:stCondLst>
-                                            <p:cond delay="0"/>
-                                          </p:stCondLst>
-                                        </p:cTn>
-                                        <p:tgtEl>
-                                          <p:spTgt spid="3">
-                                            <p:txEl>
-                                              <p:pRg st="0" end="0"/>
-                                            </p:txEl>
-                                          </p:spTgt>
-                                        </p:tgtEl>
-                                        <p:attrNameLst>
-                                          <p:attrName>style.visibility</p:attrName>
-                                        </p:attrNameLst>
-                                      </p:cBhvr>
-                                      <p:to>
-                                        <p:strVal val="visible"/>
-                                      </p:to>
-                                    </p:set>
-                                  </p:childTnLst>
-                                </p:cTn>
-                              </p:par>
-                            </p:childTnLst>
-                          </p:cTn>
-                        </p:par>
-                      </p:childTnLst>
-                    </p:cTn>
-                  </p:par>
-                  <p:par>
-                    <p:cTn id="7" fill="hold">
-                      <p:stCondLst>
-                        <p:cond delay="indefinite"/>
-                      </p:stCondLst>
-                      <p:childTnLst>
-                        <p:par>
-                          <p:cTn id="8" fill="hold">
-                            <p:stCondLst>
-                              <p:cond delay="0"/>
-                            </p:stCondLst>
-                            <p:childTnLst>
-                              <p:par>
-                                <p:cTn id="9" presetID="1" presetClass="entr" presetSubtype="0" fill="hold" nodeType="clickEffect">
-                                  <p:stCondLst>
-                                    <p:cond delay="0"/>
-                                  </p:stCondLst>
-                                  <p:childTnLst>
-                                    <p:set>
-                                      <p:cBhvr>
-                                        <p:cTn id="10" dur="1" fill="hold">
-                                          <p:stCondLst>
-                                            <p:cond delay="0"/>
-                                          </p:stCondLst>
-                                        </p:cTn>
-                                        <p:tgtEl>
-                                          <p:spTgt spid="3">
-                                            <p:txEl>
-                                              <p:pRg st="1" end="1"/>
-                                            </p:txEl>
-                                          </p:spTgt>
-                                        </p:tgtEl>
-                                        <p:attrNameLst>
-                                          <p:attrName>style.visibility</p:attrName>
-                                        </p:attrNameLst>
-                                      </p:cBhvr>
-                                      <p:to>
-                                        <p:strVal val="visible"/>
-                                      </p:to>
-                                    </p:set>
-                                  </p:childTnLst>
-                                </p:cTn>
-                              </p:par>
-                            </p:childTnLst>
-                          </p:cTn>
-                        </p:par>
-                      </p:childTnLst>
-                    </p:cTn>
-                  </p:par>
-                  <p:par>
-                    <p:cTn id="11" fill="hold">
-                      <p:stCondLst>
-                        <p:cond delay="indefinite"/>
-                      </p:stCondLst>
-                      <p:childTnLst>
-                        <p:par>
-                          <p:cTn id="12" fill="hold">
-                            <p:stCondLst>
-                              <p:cond delay="0"/>
-                            </p:stCondLst>
-                            <p:childTnLst>
-                              <p:par>
-                                <p:cTn id="13" presetID="1" presetClass="entr" presetSubtype="0" fill="hold" nodeType="clickEffect">
-                                  <p:stCondLst>
-                                    <p:cond delay="0"/>
-                                  </p:stCondLst>
-                                  <p:childTnLst>
-                                    <p:set>
-                                      <p:cBhvr>
-                                        <p:cTn id="14" dur="1" fill="hold">
-                                          <p:stCondLst>
-                                            <p:cond delay="0"/>
-                                          </p:stCondLst>
-                                        </p:cTn>
-                                        <p:tgtEl>
-                                          <p:spTgt spid="3">
-                                            <p:txEl>
-                                              <p:pRg st="2" end="2"/>
-                                            </p:txEl>
-                                          </p:spTgt>
-                                        </p:tgtEl>
-                                        <p:attrNameLst>
-                                          <p:attrName>style.visibility</p:attrName>
-                                        </p:attrNameLst>
-                                      </p:cBhvr>
-                                      <p:to>
-                                        <p:strVal val="visible"/>
-                                      </p:to>
-                                    </p:set>
-                                  </p:childTnLst>
-                                </p:cTn>
-                              </p:par>
-                            </p:childTnLst>
-                          </p:cTn>
-                        </p:par>
-                      </p:childTnLst>
-                    </p:cTn>
-                  </p:par>
-                  <p:par>
-                    <p:cTn id="15" fill="hold">
-                      <p:stCondLst>
-                        <p:cond delay="indefinite"/>
-                      </p:stCondLst>
-                      <p:childTnLst>
-                        <p:par>
-                          <p:cTn id="16" fill="hold">
-                            <p:stCondLst>
-                              <p:cond delay="0"/>
-                            </p:stCondLst>
-                            <p:childTnLst>
-                              <p:par>
-                                <p:cTn id="17" presetID="1" presetClass="entr" presetSubtype="0" fill="hold" nodeType="clickEffect">
-                                  <p:stCondLst>
-                                    <p:cond delay="0"/>
-                                  </p:stCondLst>
-                                  <p:childTnLst>
-                                    <p:set>
-                                      <p:cBhvr>
-                                        <p:cTn id="18" dur="1" fill="hold">
-                                          <p:stCondLst>
-                                            <p:cond delay="0"/>
-                                          </p:stCondLst>
-                                        </p:cTn>
-                                        <p:tgtEl>
-                                          <p:spTgt spid="3">
-                                            <p:txEl>
-                                              <p:pRg st="3" end="3"/>
-                                            </p:txEl>
-                                          </p:spTgt>
-                                        </p:tgtEl>
-                                        <p:attrNameLst>
-                                          <p:attrName>style.visibility</p:attrName>
-                                        </p:attrNameLst>
-                                      </p:cBhvr>
-                                      <p:to>
-                                        <p:strVal val="visible"/>
-                                      </p:to>
-                                    </p:set>
-                                  </p:childTnLst>
-                                </p:cTn>
-                              </p:par>
-                            </p:childTnLst>
-                          </p:cTn>
-                        </p:par>
-                      </p:childTnLst>
-                    </p:cTn>
-                  </p:par>
-                  <p:par>
-                    <p:cTn id="19" fill="hold">
-                      <p:stCondLst>
-                        <p:cond delay="indefinite"/>
-                      </p:stCondLst>
-                      <p:childTnLst>
-                        <p:par>
-                          <p:cTn id="20" fill="hold">
-                            <p:stCondLst>
-                              <p:cond delay="0"/>
-                            </p:stCondLst>
-                            <p:childTnLst>
-                              <p:par>
-                                <p:cTn id="21" presetID="1" presetClass="entr" presetSubtype="0" fill="hold" nodeType="clickEffect">
-                                  <p:stCondLst>
-                                    <p:cond delay="0"/>
-                                  </p:stCondLst>
-                                  <p:childTnLst>
-                                    <p:set>
-                                      <p:cBhvr>
-                                        <p:cTn id="22" dur="1" fill="hold">
-                                          <p:stCondLst>
-                                            <p:cond delay="0"/>
-                                          </p:stCondLst>
-                                        </p:cTn>
-                                        <p:tgtEl>
-                                          <p:spTgt spid="3">
-                                            <p:txEl>
-                                              <p:pRg st="4" end="4"/>
-                                            </p:txEl>
-                                          </p:spTgt>
-                                        </p:tgtEl>
-                                        <p:attrNameLst>
-                                          <p:attrName>style.visibility</p:attrName>
-                                        </p:attrNameLst>
-                                      </p:cBhvr>
-                                      <p:to>
-                                        <p:strVal val="visible"/>
-                                      </p:to>
-                                    </p:set>
-                                  </p:childTnLst>
-                                </p:cTn>
-                              </p:par>
-                            </p:childTnLst>
-                          </p:cTn>
-                        </p:par>
-                      </p:childTnLst>
-                    </p:cTn>
-                  </p:par>
-                  <p:par>
-                    <p:cTn id="23" fill="hold">
-                      <p:stCondLst>
-                        <p:cond delay="indefinite"/>
-                      </p:stCondLst>
-                      <p:childTnLst>
-                        <p:par>
-                          <p:cTn id="24" fill="hold">
-                            <p:stCondLst>
-                              <p:cond delay="0"/>
-                            </p:stCondLst>
-                            <p:childTnLst>
-                              <p:par>
-                                <p:cTn id="25" presetID="1" presetClass="entr" presetSubtype="0" fill="hold" nodeType="clickEffect">
-                                  <p:stCondLst>
-                                    <p:cond delay="0"/>
-                                  </p:stCondLst>
-                                  <p:childTnLst>
-                                    <p:set>
-                                      <p:cBhvr>
-                                        <p:cTn id="26" dur="1" fill="hold">
-                                          <p:stCondLst>
-                                            <p:cond delay="0"/>
-                                          </p:stCondLst>
-                                        </p:cTn>
-                                        <p:tgtEl>
-                                          <p:spTgt spid="3">
-                                            <p:txEl>
-                                              <p:pRg st="5" end="5"/>
-                                            </p:txEl>
-                                          </p:spTgt>
-                                        </p:tgtEl>
-                                        <p:attrNameLst>
-                                          <p:attrName>style.visibility</p:attrName>
-                                        </p:attrNameLst>
-                                      </p:cBhvr>
-                                      <p:to>
-                                        <p:strVal val="visible"/>
-                                      </p:to>
-                                    </p:set>
-                                  </p:childTnLst>
-                                </p:cTn>
-                              </p:par>
-                            </p:childTnLst>
-                          </p:cTn>
-                        </p:par>
-                      </p:childTnLst>
-                    </p:cTn>
-                  </p:par>
-                  <p:par>
-                    <p:cTn id="27" fill="hold">
-                      <p:stCondLst>
-                        <p:cond delay="indefinite"/>
-                      </p:stCondLst>
-                      <p:childTnLst>
-                        <p:par>
-                          <p:cTn id="28" fill="hold">
-                            <p:stCondLst>
-                              <p:cond delay="0"/>
-                            </p:stCondLst>
-                            <p:childTnLst>
-                              <p:par>
-                                <p:cTn id="29" presetID="1" presetClass="entr" presetSubtype="0" fill="hold" nodeType="clickEffect">
-                                  <p:stCondLst>
-                                    <p:cond delay="0"/>
-                                  </p:stCondLst>
-                                  <p:childTnLst>
-                                    <p:set>
-                                      <p:cBhvr>
-                                        <p:cTn id="30" dur="1" fill="hold">
-                                          <p:stCondLst>
-                                            <p:cond delay="0"/>
-                                          </p:stCondLst>
-                                        </p:cTn>
-                                        <p:tgtEl>
-                                          <p:spTgt spid="3">
-                                            <p:txEl>
-                                              <p:pRg st="6" end="6"/>
-                                            </p:txEl>
-                                          </p:spTgt>
-                                        </p:tgtEl>
-                                        <p:attrNameLst>
-                                          <p:attrName>style.visibility</p:attrName>
-                                        </p:attrNameLst>
-                                      </p:cBhvr>
-                                      <p:to>
-                                        <p:strVal val="visible"/>
-                                      </p:to>
-                                    </p:set>
-                                  </p:childTnLst>
-                                </p:cTn>
-                              </p:par>
-                            </p:childTnLst>
-                          </p:cTn>
-                        </p:par>
-                      </p:childTnLst>
-                    </p:cTn>
-                  </p:par>
-                  <p:par>
-                    <p:cTn id="31" fill="hold">
-                      <p:stCondLst>
-                        <p:cond delay="indefinite"/>
-                      </p:stCondLst>
-                      <p:childTnLst>
-                        <p:par>
-                          <p:cTn id="32" fill="hold">
-                            <p:stCondLst>
-                              <p:cond delay="0"/>
-                            </p:stCondLst>
-                            <p:childTnLst>
-                              <p:par>
-                                <p:cTn id="33" presetID="1" presetClass="entr" presetSubtype="0" fill="hold" nodeType="clickEffect">
-                                  <p:stCondLst>
-                                    <p:cond delay="0"/>
-                                  </p:stCondLst>
-                                  <p:childTnLst>
-                                    <p:set>
-                                      <p:cBhvr>
-                                        <p:cTn id="34" dur="1" fill="hold">
-                                          <p:stCondLst>
-                                            <p:cond delay="0"/>
-                                          </p:stCondLst>
-                                        </p:cTn>
-                                        <p:tgtEl>
-                                          <p:spTgt spid="3">
-                                            <p:txEl>
-                                              <p:pRg st="7" end="7"/>
-                                            </p:txEl>
-                                          </p:spTgt>
-                                        </p:tgtEl>
-                                        <p:attrNameLst>
-                                          <p:attrName>style.visibility</p:attrName>
-                                        </p:attrNameLst>
-                                      </p:cBhvr>
-                                      <p:to>
-                                        <p:strVal val="visible"/>
-                                      </p:to>
-                                    </p:set>
-                                  </p:childTnLst>
-                                </p:cTn>
-                              </p:par>
-                            </p:childTnLst>
-                          </p:cTn>
-                        </p:par>
-                      </p:childTnLst>
-                    </p:cTn>
-                  </p:par>
-                  <p:par>
-                    <p:cTn id="35" fill="hold">
-                      <p:stCondLst>
-                        <p:cond delay="indefinite"/>
-                      </p:stCondLst>
-                      <p:childTnLst>
-                        <p:par>
-                          <p:cTn id="36" fill="hold">
-                            <p:stCondLst>
-                              <p:cond delay="0"/>
-                            </p:stCondLst>
-                            <p:childTnLst>
-                              <p:par>
-                                <p:cTn id="37" presetID="1" presetClass="entr" presetSubtype="0" fill="hold" nodeType="clickEffect">
-                                  <p:stCondLst>
-                                    <p:cond delay="0"/>
-                                  </p:stCondLst>
-                                  <p:childTnLst>
-                                    <p:set>
-                                      <p:cBhvr>
-                                        <p:cTn id="38" dur="1" fill="hold">
-                                          <p:stCondLst>
-                                            <p:cond delay="0"/>
-                                          </p:stCondLst>
-                                        </p:cTn>
-                                        <p:tgtEl>
-                                          <p:spTgt spid="3">
-                                            <p:txEl>
-                                              <p:pRg st="8" end="8"/>
-                                            </p:txEl>
-                                          </p:spTgt>
-                                        </p:tgtEl>
-                                        <p:attrNameLst>
-                                          <p:attrName>style.visibility</p:attrName>
-                                        </p:attrNameLst>
-                                      </p:cBhvr>
-                                      <p:to>
-                                        <p:strVal val="visible"/>
-                                      </p:to>
-                                    </p:set>
-                                  </p:childTnLst>
-                                </p:cTn>
-                              </p:par>
-                            </p:childTnLst>
-                          </p:cTn>
-                        </p:par>
-                      </p:childTnLst>
-                    </p:cTn>
-                  </p:par>
-                </p:childTnLst>
-              </p:cTn>
-              <p:prevCondLst>
-                <p:cond evt="onPrev" delay="0">
-                  <p:tgtEl>
-                    <p:sldTgt/>
-                  </p:tgtEl>
-                </p:cond>
-              </p:prevCondLst>
-              <p:nextCondLst>
-                <p:cond evt="onNext" delay="0">
-                  <p:tgtEl>
-                    <p:sldTgt/>
-                  </p:tgtEl>
-                </p:cond>
-              </p:nextCondLst>
-            </p:seq>
-          </p:childTnLst>
-        </p:cTn>
-      </p:par>
-    </p:tnLst>
-  </p:timing>
-</p:sld>
-</file>
-
-<file path=ppt/slides/slide19.xml><?xml version="1.0" encoding="utf-8"?>
-<p:sld xmlns:a="http://schemas.openxmlformats.org/drawingml/2006/main" xmlns:r="http://schemas.openxmlformats.org/officeDocument/2006/relationships" xmlns:p="http://schemas.openxmlformats.org/presentationml/2006/main">
-  <p:cSld>
-    <p:spTree>
-      <p:nvGrpSpPr>
-        <p:cNvPr id="1" name=""/>
-        <p:cNvGrpSpPr/>
-        <p:nvPr/>
-      </p:nvGrpSpPr>
-      <p:grpSpPr>
-        <a:xfrm>
-          <a:off x="0" y="0"/>
-          <a:ext cx="0" cy="0"/>
-          <a:chOff x="0" y="0"/>
-          <a:chExt cx="0" cy="0"/>
-        </a:xfrm>
-      </p:grpSpPr>
-      <p:pic>
-        <p:nvPicPr>
-          <p:cNvPr id="4" name="Picture 3" descr="A diagram of a program&#10;&#10;AI-generated content may be incorrect.">
-            <a:extLst>
-              <a:ext uri="{FF2B5EF4-FFF2-40B4-BE49-F238E27FC236}">
-                <a16:creationId xmlns:a16="http://schemas.microsoft.com/office/drawing/2014/main" id="{9EFC0359-D6BB-2671-E549-C7E6A044EA38}"/>
-              </a:ext>
-            </a:extLst>
-          </p:cNvPr>
-          <p:cNvPicPr>
-            <a:picLocks noChangeAspect="1"/>
-          </p:cNvPicPr>
-          <p:nvPr/>
-        </p:nvPicPr>
-        <p:blipFill>
-          <a:blip r:embed="rId2"/>
-          <a:stretch>
-            <a:fillRect/>
-          </a:stretch>
-        </p:blipFill>
-        <p:spPr>
-          <a:xfrm>
-            <a:off x="6684178" y="365125"/>
-            <a:ext cx="5211574" cy="3534845"/>
-          </a:xfrm>
-          <a:prstGeom prst="rect">
-            <a:avLst/>
-          </a:prstGeom>
-        </p:spPr>
-      </p:pic>
-      <p:sp>
-        <p:nvSpPr>
-          <p:cNvPr id="2" name="Title 1">
-            <a:extLst>
-              <a:ext uri="{FF2B5EF4-FFF2-40B4-BE49-F238E27FC236}">
-                <a16:creationId xmlns:a16="http://schemas.microsoft.com/office/drawing/2014/main" id="{BDE0A8BF-58BF-D486-F58A-FE2AB1ED936E}"/>
-              </a:ext>
-            </a:extLst>
-          </p:cNvPr>
-          <p:cNvSpPr>
-            <a:spLocks noGrp="1"/>
-          </p:cNvSpPr>
-          <p:nvPr>
-            <p:ph type="title"/>
-          </p:nvPr>
-        </p:nvSpPr>
-        <p:spPr/>
-        <p:txBody>
-          <a:bodyPr/>
-          <a:lstStyle/>
-          <a:p>
-            <a:r>
-              <a:rPr lang="en-US" dirty="0"/>
-              <a:t>Implementation Key Principles</a:t>
-            </a:r>
-          </a:p>
-        </p:txBody>
-      </p:sp>
-      <p:sp>
-        <p:nvSpPr>
-          <p:cNvPr id="3" name="Content Placeholder 2">
-            <a:extLst>
-              <a:ext uri="{FF2B5EF4-FFF2-40B4-BE49-F238E27FC236}">
-                <a16:creationId xmlns:a16="http://schemas.microsoft.com/office/drawing/2014/main" id="{F0C3CF3A-EAE5-F37B-8A85-BCC789FBA344}"/>
-              </a:ext>
-            </a:extLst>
-          </p:cNvPr>
-          <p:cNvSpPr>
-            <a:spLocks noGrp="1"/>
-          </p:cNvSpPr>
-          <p:nvPr>
-            <p:ph idx="1"/>
-          </p:nvPr>
-        </p:nvSpPr>
-        <p:spPr>
-          <a:xfrm>
-            <a:off x="838200" y="1825624"/>
-            <a:ext cx="10515600" cy="5032376"/>
-          </a:xfrm>
-        </p:spPr>
-        <p:txBody>
-          <a:bodyPr>
-            <a:normAutofit fontScale="92500" lnSpcReduction="10000"/>
-          </a:bodyPr>
-          <a:lstStyle/>
-          <a:p>
-            <a:r>
-              <a:rPr lang="en-US" dirty="0"/>
-              <a:t>Data locality</a:t>
-            </a:r>
-          </a:p>
-          <a:p>
-            <a:pPr lvl="1"/>
-            <a:r>
-              <a:rPr lang="en-US" dirty="0"/>
-              <a:t>Reduce network bandwidth: ship code to data</a:t>
-            </a:r>
-          </a:p>
-          <a:p>
-            <a:pPr lvl="1"/>
-            <a:r>
-              <a:rPr lang="en-US" dirty="0"/>
-              <a:t>Locally persist (not DFS) intermediate results</a:t>
-            </a:r>
-          </a:p>
-          <a:p>
-            <a:r>
-              <a:rPr lang="en-US" dirty="0"/>
-              <a:t>Handle failures by re-doing </a:t>
-            </a:r>
-            <a:r>
-              <a:rPr lang="en-US" dirty="0">
-                <a:solidFill>
-                  <a:srgbClr val="C00000"/>
-                </a:solidFill>
-              </a:rPr>
-              <a:t>compute</a:t>
-            </a:r>
-          </a:p>
-          <a:p>
-            <a:pPr lvl="1"/>
-            <a:r>
-              <a:rPr lang="en-US" dirty="0"/>
-              <a:t>No fancy hardware fault tolerance (e.g., RAID)</a:t>
-            </a:r>
-          </a:p>
-          <a:p>
-            <a:pPr lvl="1"/>
-            <a:r>
-              <a:rPr lang="en-US" dirty="0"/>
-              <a:t>Mapper failure: restart map job</a:t>
-            </a:r>
-          </a:p>
-          <a:p>
-            <a:pPr lvl="1"/>
-            <a:r>
-              <a:rPr lang="en-US" dirty="0"/>
-              <a:t>Assume deterministic operations</a:t>
-            </a:r>
-          </a:p>
-          <a:p>
-            <a:pPr lvl="1"/>
-            <a:r>
-              <a:rPr lang="en-US" dirty="0"/>
-              <a:t>Reducer failure (after completion): no problem (DFS)</a:t>
-            </a:r>
-          </a:p>
-          <a:p>
-            <a:r>
-              <a:rPr lang="en-US" dirty="0"/>
-              <a:t>Identify and skip shards with </a:t>
-            </a:r>
-            <a:r>
-              <a:rPr lang="en-US" dirty="0">
-                <a:solidFill>
-                  <a:srgbClr val="C00000"/>
-                </a:solidFill>
-              </a:rPr>
-              <a:t>deterministic </a:t>
-            </a:r>
-            <a:r>
-              <a:rPr lang="en-US" dirty="0"/>
-              <a:t>faults</a:t>
-            </a:r>
-          </a:p>
-          <a:p>
-            <a:r>
-              <a:rPr lang="en-US" dirty="0"/>
-              <a:t>Mitigate </a:t>
-            </a:r>
-            <a:r>
-              <a:rPr lang="en-US" dirty="0">
-                <a:solidFill>
-                  <a:srgbClr val="C00000"/>
-                </a:solidFill>
-              </a:rPr>
-              <a:t>stragglers</a:t>
-            </a:r>
-            <a:r>
-              <a:rPr lang="en-US" dirty="0"/>
-              <a:t> through </a:t>
-            </a:r>
-            <a:r>
-              <a:rPr lang="en-US" dirty="0">
-                <a:solidFill>
-                  <a:srgbClr val="C00000"/>
-                </a:solidFill>
-              </a:rPr>
-              <a:t>eager replication of compute </a:t>
-            </a:r>
-            <a:r>
-              <a:rPr lang="en-US" dirty="0"/>
-              <a:t>close to job completion</a:t>
-            </a:r>
-          </a:p>
-          <a:p>
-            <a:r>
-              <a:rPr lang="en-US" dirty="0">
-                <a:solidFill>
-                  <a:srgbClr val="C00000"/>
-                </a:solidFill>
-              </a:rPr>
-              <a:t>Combiners</a:t>
-            </a:r>
-            <a:r>
-              <a:rPr lang="en-US" dirty="0"/>
-              <a:t> at mapper: preliminary reduce for associative and commutative functions</a:t>
-            </a:r>
-          </a:p>
-          <a:p>
-            <a:pPr lvl="1"/>
-            <a:endParaRPr lang="en-US" dirty="0"/>
-          </a:p>
-          <a:p>
-            <a:endParaRPr lang="en-US" dirty="0"/>
-          </a:p>
-        </p:txBody>
-      </p:sp>
-      <p:pic>
-        <p:nvPicPr>
-          <p:cNvPr id="5" name="Picture 4" descr="A picture containing shape&#10;&#10;Description automatically generated">
-            <a:extLst>
-              <a:ext uri="{FF2B5EF4-FFF2-40B4-BE49-F238E27FC236}">
-                <a16:creationId xmlns:a16="http://schemas.microsoft.com/office/drawing/2014/main" id="{2AC62E66-8CAF-E460-905E-E79F1C1529CB}"/>
-              </a:ext>
-            </a:extLst>
-          </p:cNvPr>
-          <p:cNvPicPr>
-            <a:picLocks noChangeAspect="1"/>
-          </p:cNvPicPr>
-          <p:nvPr/>
-        </p:nvPicPr>
-        <p:blipFill>
-          <a:blip r:embed="rId3"/>
-          <a:stretch>
-            <a:fillRect/>
-          </a:stretch>
-        </p:blipFill>
-        <p:spPr>
-          <a:xfrm>
-            <a:off x="7544984" y="1571200"/>
-            <a:ext cx="423534" cy="508849"/>
-          </a:xfrm>
-          <a:prstGeom prst="rect">
-            <a:avLst/>
-          </a:prstGeom>
-        </p:spPr>
-      </p:pic>
-      <p:pic>
-        <p:nvPicPr>
-          <p:cNvPr id="6" name="Picture 5" descr="A picture containing shape&#10;&#10;Description automatically generated">
-            <a:extLst>
-              <a:ext uri="{FF2B5EF4-FFF2-40B4-BE49-F238E27FC236}">
-                <a16:creationId xmlns:a16="http://schemas.microsoft.com/office/drawing/2014/main" id="{A2A255F7-0B7D-A10C-91BB-798E1D9FEAF5}"/>
-              </a:ext>
-            </a:extLst>
-          </p:cNvPr>
-          <p:cNvPicPr>
-            <a:picLocks noChangeAspect="1"/>
-          </p:cNvPicPr>
-          <p:nvPr/>
-        </p:nvPicPr>
-        <p:blipFill>
-          <a:blip r:embed="rId3"/>
-          <a:stretch>
-            <a:fillRect/>
-          </a:stretch>
-        </p:blipFill>
-        <p:spPr>
-          <a:xfrm>
-            <a:off x="7557746" y="2327143"/>
-            <a:ext cx="398010" cy="478183"/>
-          </a:xfrm>
-          <a:prstGeom prst="rect">
-            <a:avLst/>
-          </a:prstGeom>
-        </p:spPr>
-      </p:pic>
-    </p:spTree>
-    <p:extLst>
-      <p:ext uri="{BB962C8B-B14F-4D97-AF65-F5344CB8AC3E}">
-        <p14:creationId xmlns:p14="http://schemas.microsoft.com/office/powerpoint/2010/main" val="1990883799"/>
-      </p:ext>
-    </p:extLst>
-  </p:cSld>
-  <p:clrMapOvr>
-    <a:masterClrMapping/>
-  </p:clrMapOvr>
-  <p:timing>
-    <p:tnLst>
-      <p:par>
-        <p:cTn id="1" dur="indefinite" restart="never" nodeType="tmRoot">
-          <p:childTnLst>
-            <p:seq concurrent="1" nextAc="seek">
-              <p:cTn id="2" dur="indefinite" nodeType="mainSeq">
-                <p:childTnLst>
-                  <p:par>
-                    <p:cTn id="3" fill="hold">
-                      <p:stCondLst>
-                        <p:cond delay="indefinite"/>
-                      </p:stCondLst>
-                      <p:childTnLst>
-                        <p:par>
-                          <p:cTn id="4" fill="hold">
-                            <p:stCondLst>
-                              <p:cond delay="0"/>
-                            </p:stCondLst>
-                            <p:childTnLst>
-                              <p:par>
-                                <p:cTn id="5" presetID="1" presetClass="entr" presetSubtype="0" fill="hold" nodeType="clickEffect">
-                                  <p:stCondLst>
-                                    <p:cond delay="0"/>
-                                  </p:stCondLst>
-                                  <p:childTnLst>
-                                    <p:set>
-                                      <p:cBhvr>
-                                        <p:cTn id="6" dur="1" fill="hold">
-                                          <p:stCondLst>
-                                            <p:cond delay="0"/>
-                                          </p:stCondLst>
-                                        </p:cTn>
-                                        <p:tgtEl>
-                                          <p:spTgt spid="3">
-                                            <p:txEl>
-                                              <p:pRg st="0" end="0"/>
-                                            </p:txEl>
-                                          </p:spTgt>
-                                        </p:tgtEl>
-                                        <p:attrNameLst>
-                                          <p:attrName>style.visibility</p:attrName>
-                                        </p:attrNameLst>
-                                      </p:cBhvr>
-                                      <p:to>
-                                        <p:strVal val="visible"/>
-                                      </p:to>
-                                    </p:set>
-                                  </p:childTnLst>
-                                </p:cTn>
-                              </p:par>
-                            </p:childTnLst>
-                          </p:cTn>
-                        </p:par>
-                      </p:childTnLst>
-                    </p:cTn>
-                  </p:par>
-                  <p:par>
-                    <p:cTn id="7" fill="hold">
-                      <p:stCondLst>
-                        <p:cond delay="indefinite"/>
-                      </p:stCondLst>
-                      <p:childTnLst>
-                        <p:par>
-                          <p:cTn id="8" fill="hold">
-                            <p:stCondLst>
-                              <p:cond delay="0"/>
-                            </p:stCondLst>
-                            <p:childTnLst>
-                              <p:par>
-                                <p:cTn id="9" presetID="1" presetClass="entr" presetSubtype="0" fill="hold" nodeType="clickEffect">
-                                  <p:stCondLst>
-                                    <p:cond delay="0"/>
-                                  </p:stCondLst>
-                                  <p:childTnLst>
-                                    <p:set>
-                                      <p:cBhvr>
-                                        <p:cTn id="10" dur="1" fill="hold">
-                                          <p:stCondLst>
-                                            <p:cond delay="0"/>
-                                          </p:stCondLst>
-                                        </p:cTn>
-                                        <p:tgtEl>
-                                          <p:spTgt spid="3">
-                                            <p:txEl>
-                                              <p:pRg st="1" end="1"/>
-                                            </p:txEl>
-                                          </p:spTgt>
-                                        </p:tgtEl>
-                                        <p:attrNameLst>
-                                          <p:attrName>style.visibility</p:attrName>
-                                        </p:attrNameLst>
-                                      </p:cBhvr>
-                                      <p:to>
-                                        <p:strVal val="visible"/>
-                                      </p:to>
-                                    </p:set>
-                                  </p:childTnLst>
-                                </p:cTn>
-                              </p:par>
-                            </p:childTnLst>
-                          </p:cTn>
-                        </p:par>
-                      </p:childTnLst>
-                    </p:cTn>
-                  </p:par>
-                  <p:par>
-                    <p:cTn id="11" fill="hold">
-                      <p:stCondLst>
-                        <p:cond delay="indefinite"/>
-                      </p:stCondLst>
-                      <p:childTnLst>
-                        <p:par>
-                          <p:cTn id="12" fill="hold">
-                            <p:stCondLst>
-                              <p:cond delay="0"/>
-                            </p:stCondLst>
-                            <p:childTnLst>
-                              <p:par>
-                                <p:cTn id="13" presetID="9" presetClass="entr" presetSubtype="0" fill="hold" nodeType="clickEffect">
-                                  <p:stCondLst>
-                                    <p:cond delay="0"/>
-                                  </p:stCondLst>
-                                  <p:childTnLst>
-                                    <p:set>
-                                      <p:cBhvr>
-                                        <p:cTn id="14" dur="1" fill="hold">
-                                          <p:stCondLst>
-                                            <p:cond delay="0"/>
-                                          </p:stCondLst>
-                                        </p:cTn>
-                                        <p:tgtEl>
-                                          <p:spTgt spid="5"/>
-                                        </p:tgtEl>
-                                        <p:attrNameLst>
-                                          <p:attrName>style.visibility</p:attrName>
-                                        </p:attrNameLst>
-                                      </p:cBhvr>
-                                      <p:to>
-                                        <p:strVal val="visible"/>
-                                      </p:to>
-                                    </p:set>
-                                    <p:animEffect transition="in" filter="dissolve">
-                                      <p:cBhvr>
-                                        <p:cTn id="15" dur="500"/>
-                                        <p:tgtEl>
-                                          <p:spTgt spid="5"/>
-                                        </p:tgtEl>
-                                      </p:cBhvr>
-                                    </p:animEffect>
-                                  </p:childTnLst>
-                                </p:cTn>
-                              </p:par>
-                              <p:par>
-                                <p:cTn id="16" presetID="9" presetClass="entr" presetSubtype="0" fill="hold" nodeType="withEffect">
-                                  <p:stCondLst>
-                                    <p:cond delay="0"/>
-                                  </p:stCondLst>
-                                  <p:childTnLst>
-                                    <p:set>
-                                      <p:cBhvr>
-                                        <p:cTn id="17" dur="1" fill="hold">
-                                          <p:stCondLst>
-                                            <p:cond delay="0"/>
-                                          </p:stCondLst>
-                                        </p:cTn>
-                                        <p:tgtEl>
-                                          <p:spTgt spid="6"/>
-                                        </p:tgtEl>
-                                        <p:attrNameLst>
-                                          <p:attrName>style.visibility</p:attrName>
-                                        </p:attrNameLst>
-                                      </p:cBhvr>
-                                      <p:to>
-                                        <p:strVal val="visible"/>
-                                      </p:to>
-                                    </p:set>
-                                    <p:animEffect transition="in" filter="dissolve">
-                                      <p:cBhvr>
-                                        <p:cTn id="18" dur="500"/>
-                                        <p:tgtEl>
-                                          <p:spTgt spid="6"/>
-                                        </p:tgtEl>
-                                      </p:cBhvr>
-                                    </p:animEffect>
-                                  </p:childTnLst>
-                                </p:cTn>
-                              </p:par>
-                            </p:childTnLst>
-                          </p:cTn>
-                        </p:par>
-                      </p:childTnLst>
-                    </p:cTn>
-                  </p:par>
-                  <p:par>
-                    <p:cTn id="19" fill="hold">
-                      <p:stCondLst>
-                        <p:cond delay="indefinite"/>
-                      </p:stCondLst>
-                      <p:childTnLst>
-                        <p:par>
-                          <p:cTn id="20" fill="hold">
-                            <p:stCondLst>
-                              <p:cond delay="0"/>
-                            </p:stCondLst>
-                            <p:childTnLst>
-                              <p:par>
-                                <p:cTn id="21" presetID="1" presetClass="entr" presetSubtype="0" fill="hold" nodeType="clickEffect">
-                                  <p:stCondLst>
-                                    <p:cond delay="0"/>
-                                  </p:stCondLst>
-                                  <p:childTnLst>
-                                    <p:set>
-                                      <p:cBhvr>
-                                        <p:cTn id="22" dur="1" fill="hold">
-                                          <p:stCondLst>
-                                            <p:cond delay="0"/>
-                                          </p:stCondLst>
-                                        </p:cTn>
-                                        <p:tgtEl>
-                                          <p:spTgt spid="3">
-                                            <p:txEl>
-                                              <p:pRg st="2" end="2"/>
-                                            </p:txEl>
-                                          </p:spTgt>
-                                        </p:tgtEl>
-                                        <p:attrNameLst>
-                                          <p:attrName>style.visibility</p:attrName>
-                                        </p:attrNameLst>
-                                      </p:cBhvr>
-                                      <p:to>
-                                        <p:strVal val="visible"/>
-                                      </p:to>
-                                    </p:set>
-                                  </p:childTnLst>
-                                </p:cTn>
-                              </p:par>
-                            </p:childTnLst>
-                          </p:cTn>
-                        </p:par>
-                      </p:childTnLst>
-                    </p:cTn>
-                  </p:par>
-                  <p:par>
-                    <p:cTn id="23" fill="hold">
-                      <p:stCondLst>
-                        <p:cond delay="indefinite"/>
-                      </p:stCondLst>
-                      <p:childTnLst>
-                        <p:par>
-                          <p:cTn id="24" fill="hold">
-                            <p:stCondLst>
-                              <p:cond delay="0"/>
-                            </p:stCondLst>
-                            <p:childTnLst>
-                              <p:par>
-                                <p:cTn id="25" presetID="1" presetClass="entr" presetSubtype="0" fill="hold" nodeType="clickEffect">
-                                  <p:stCondLst>
-                                    <p:cond delay="0"/>
-                                  </p:stCondLst>
-                                  <p:childTnLst>
-                                    <p:set>
-                                      <p:cBhvr>
-                                        <p:cTn id="26" dur="1" fill="hold">
-                                          <p:stCondLst>
-                                            <p:cond delay="0"/>
-                                          </p:stCondLst>
-                                        </p:cTn>
-                                        <p:tgtEl>
-                                          <p:spTgt spid="3">
-                                            <p:txEl>
-                                              <p:pRg st="3" end="3"/>
-                                            </p:txEl>
-                                          </p:spTgt>
-                                        </p:tgtEl>
-                                        <p:attrNameLst>
-                                          <p:attrName>style.visibility</p:attrName>
-                                        </p:attrNameLst>
-                                      </p:cBhvr>
-                                      <p:to>
-                                        <p:strVal val="visible"/>
-                                      </p:to>
-                                    </p:set>
-                                  </p:childTnLst>
-                                </p:cTn>
-                              </p:par>
-                            </p:childTnLst>
-                          </p:cTn>
-                        </p:par>
-                      </p:childTnLst>
-                    </p:cTn>
-                  </p:par>
-                  <p:par>
-                    <p:cTn id="27" fill="hold">
-                      <p:stCondLst>
-                        <p:cond delay="indefinite"/>
-                      </p:stCondLst>
-                      <p:childTnLst>
-                        <p:par>
-                          <p:cTn id="28" fill="hold">
-                            <p:stCondLst>
-                              <p:cond delay="0"/>
-                            </p:stCondLst>
-                            <p:childTnLst>
-                              <p:par>
-                                <p:cTn id="29" presetID="1" presetClass="entr" presetSubtype="0" fill="hold" nodeType="clickEffect">
-                                  <p:stCondLst>
-                                    <p:cond delay="0"/>
-                                  </p:stCondLst>
-                                  <p:childTnLst>
-                                    <p:set>
-                                      <p:cBhvr>
-                                        <p:cTn id="30" dur="1" fill="hold">
-                                          <p:stCondLst>
-                                            <p:cond delay="0"/>
-                                          </p:stCondLst>
-                                        </p:cTn>
-                                        <p:tgtEl>
-                                          <p:spTgt spid="3">
-                                            <p:txEl>
-                                              <p:pRg st="4" end="4"/>
-                                            </p:txEl>
-                                          </p:spTgt>
-                                        </p:tgtEl>
-                                        <p:attrNameLst>
-                                          <p:attrName>style.visibility</p:attrName>
-                                        </p:attrNameLst>
-                                      </p:cBhvr>
-                                      <p:to>
-                                        <p:strVal val="visible"/>
-                                      </p:to>
-                                    </p:set>
-                                  </p:childTnLst>
-                                </p:cTn>
-                              </p:par>
-                            </p:childTnLst>
-                          </p:cTn>
-                        </p:par>
-                      </p:childTnLst>
-                    </p:cTn>
-                  </p:par>
-                  <p:par>
-                    <p:cTn id="31" fill="hold">
-                      <p:stCondLst>
-                        <p:cond delay="indefinite"/>
-                      </p:stCondLst>
-                      <p:childTnLst>
-                        <p:par>
-                          <p:cTn id="32" fill="hold">
-                            <p:stCondLst>
-                              <p:cond delay="0"/>
-                            </p:stCondLst>
-                            <p:childTnLst>
-                              <p:par>
-                                <p:cTn id="33" presetID="1" presetClass="entr" presetSubtype="0" fill="hold" nodeType="clickEffect">
-                                  <p:stCondLst>
-                                    <p:cond delay="0"/>
-                                  </p:stCondLst>
-                                  <p:childTnLst>
-                                    <p:set>
-                                      <p:cBhvr>
-                                        <p:cTn id="34" dur="1" fill="hold">
-                                          <p:stCondLst>
-                                            <p:cond delay="0"/>
-                                          </p:stCondLst>
-                                        </p:cTn>
-                                        <p:tgtEl>
-                                          <p:spTgt spid="3">
-                                            <p:txEl>
-                                              <p:pRg st="5" end="5"/>
-                                            </p:txEl>
-                                          </p:spTgt>
-                                        </p:tgtEl>
-                                        <p:attrNameLst>
-                                          <p:attrName>style.visibility</p:attrName>
-                                        </p:attrNameLst>
-                                      </p:cBhvr>
-                                      <p:to>
-                                        <p:strVal val="visible"/>
-                                      </p:to>
-                                    </p:set>
-                                  </p:childTnLst>
-                                </p:cTn>
-                              </p:par>
-                            </p:childTnLst>
-                          </p:cTn>
-                        </p:par>
-                      </p:childTnLst>
-                    </p:cTn>
-                  </p:par>
-                  <p:par>
-                    <p:cTn id="35" fill="hold">
-                      <p:stCondLst>
-                        <p:cond delay="indefinite"/>
-                      </p:stCondLst>
-                      <p:childTnLst>
-                        <p:par>
-                          <p:cTn id="36" fill="hold">
-                            <p:stCondLst>
-                              <p:cond delay="0"/>
-                            </p:stCondLst>
-                            <p:childTnLst>
-                              <p:par>
-                                <p:cTn id="37" presetID="1" presetClass="entr" presetSubtype="0" fill="hold" nodeType="clickEffect">
-                                  <p:stCondLst>
-                                    <p:cond delay="0"/>
-                                  </p:stCondLst>
-                                  <p:childTnLst>
-                                    <p:set>
-                                      <p:cBhvr>
-                                        <p:cTn id="38" dur="1" fill="hold">
-                                          <p:stCondLst>
-                                            <p:cond delay="0"/>
-                                          </p:stCondLst>
-                                        </p:cTn>
-                                        <p:tgtEl>
-                                          <p:spTgt spid="3">
-                                            <p:txEl>
-                                              <p:pRg st="6" end="6"/>
-                                            </p:txEl>
-                                          </p:spTgt>
-                                        </p:tgtEl>
-                                        <p:attrNameLst>
-                                          <p:attrName>style.visibility</p:attrName>
-                                        </p:attrNameLst>
-                                      </p:cBhvr>
-                                      <p:to>
-                                        <p:strVal val="visible"/>
-                                      </p:to>
-                                    </p:set>
-                                  </p:childTnLst>
-                                </p:cTn>
-                              </p:par>
-                            </p:childTnLst>
-                          </p:cTn>
-                        </p:par>
-                      </p:childTnLst>
-                    </p:cTn>
-                  </p:par>
-                  <p:par>
-                    <p:cTn id="39" fill="hold">
-                      <p:stCondLst>
-                        <p:cond delay="indefinite"/>
-                      </p:stCondLst>
-                      <p:childTnLst>
-                        <p:par>
-                          <p:cTn id="40" fill="hold">
-                            <p:stCondLst>
-                              <p:cond delay="0"/>
-                            </p:stCondLst>
-                            <p:childTnLst>
-                              <p:par>
-                                <p:cTn id="41" presetID="1" presetClass="entr" presetSubtype="0" fill="hold" nodeType="clickEffect">
-                                  <p:stCondLst>
-                                    <p:cond delay="0"/>
-                                  </p:stCondLst>
-                                  <p:childTnLst>
-                                    <p:set>
-                                      <p:cBhvr>
-                                        <p:cTn id="42" dur="1" fill="hold">
-                                          <p:stCondLst>
-                                            <p:cond delay="0"/>
-                                          </p:stCondLst>
-                                        </p:cTn>
-                                        <p:tgtEl>
-                                          <p:spTgt spid="3">
-                                            <p:txEl>
-                                              <p:pRg st="7" end="7"/>
-                                            </p:txEl>
-                                          </p:spTgt>
-                                        </p:tgtEl>
-                                        <p:attrNameLst>
-                                          <p:attrName>style.visibility</p:attrName>
-                                        </p:attrNameLst>
-                                      </p:cBhvr>
-                                      <p:to>
-                                        <p:strVal val="visible"/>
-                                      </p:to>
-                                    </p:set>
-                                  </p:childTnLst>
-                                </p:cTn>
-                              </p:par>
-                            </p:childTnLst>
-                          </p:cTn>
-                        </p:par>
-                      </p:childTnLst>
-                    </p:cTn>
-                  </p:par>
-                  <p:par>
-                    <p:cTn id="43" fill="hold">
-                      <p:stCondLst>
-                        <p:cond delay="indefinite"/>
-                      </p:stCondLst>
-                      <p:childTnLst>
-                        <p:par>
-                          <p:cTn id="44" fill="hold">
-                            <p:stCondLst>
-                              <p:cond delay="0"/>
-                            </p:stCondLst>
-                            <p:childTnLst>
-                              <p:par>
-                                <p:cTn id="45" presetID="1" presetClass="entr" presetSubtype="0" fill="hold" nodeType="clickEffect">
-                                  <p:stCondLst>
-                                    <p:cond delay="0"/>
-                                  </p:stCondLst>
-                                  <p:childTnLst>
-                                    <p:set>
-                                      <p:cBhvr>
-                                        <p:cTn id="46" dur="1" fill="hold">
-                                          <p:stCondLst>
-                                            <p:cond delay="0"/>
-                                          </p:stCondLst>
-                                        </p:cTn>
-                                        <p:tgtEl>
-                                          <p:spTgt spid="3">
-                                            <p:txEl>
-                                              <p:pRg st="8" end="8"/>
-                                            </p:txEl>
-                                          </p:spTgt>
-                                        </p:tgtEl>
-                                        <p:attrNameLst>
-                                          <p:attrName>style.visibility</p:attrName>
-                                        </p:attrNameLst>
-                                      </p:cBhvr>
-                                      <p:to>
-                                        <p:strVal val="visible"/>
-                                      </p:to>
-                                    </p:set>
-                                  </p:childTnLst>
-                                </p:cTn>
-                              </p:par>
-                            </p:childTnLst>
-                          </p:cTn>
-                        </p:par>
-                      </p:childTnLst>
-                    </p:cTn>
-                  </p:par>
-                  <p:par>
-                    <p:cTn id="47" fill="hold">
-                      <p:stCondLst>
-                        <p:cond delay="indefinite"/>
-                      </p:stCondLst>
-                      <p:childTnLst>
-                        <p:par>
-                          <p:cTn id="48" fill="hold">
-                            <p:stCondLst>
-                              <p:cond delay="0"/>
-                            </p:stCondLst>
-                            <p:childTnLst>
-                              <p:par>
-                                <p:cTn id="49" presetID="1" presetClass="entr" presetSubtype="0" fill="hold" nodeType="clickEffect">
-                                  <p:stCondLst>
-                                    <p:cond delay="0"/>
-                                  </p:stCondLst>
-                                  <p:childTnLst>
-                                    <p:set>
-                                      <p:cBhvr>
-                                        <p:cTn id="50" dur="1" fill="hold">
-                                          <p:stCondLst>
-                                            <p:cond delay="0"/>
-                                          </p:stCondLst>
-                                        </p:cTn>
-                                        <p:tgtEl>
-                                          <p:spTgt spid="3">
-                                            <p:txEl>
-                                              <p:pRg st="9" end="9"/>
-                                            </p:txEl>
-                                          </p:spTgt>
-                                        </p:tgtEl>
-                                        <p:attrNameLst>
-                                          <p:attrName>style.visibility</p:attrName>
-                                        </p:attrNameLst>
-                                      </p:cBhvr>
-                                      <p:to>
-                                        <p:strVal val="visible"/>
-                                      </p:to>
-                                    </p:set>
-                                  </p:childTnLst>
-                                </p:cTn>
-                              </p:par>
-                            </p:childTnLst>
-                          </p:cTn>
-                        </p:par>
-                      </p:childTnLst>
-                    </p:cTn>
-                  </p:par>
-                  <p:par>
-                    <p:cTn id="51" fill="hold">
-                      <p:stCondLst>
-                        <p:cond delay="indefinite"/>
-                      </p:stCondLst>
-                      <p:childTnLst>
-                        <p:par>
-                          <p:cTn id="52" fill="hold">
-                            <p:stCondLst>
-                              <p:cond delay="0"/>
-                            </p:stCondLst>
-                            <p:childTnLst>
-                              <p:par>
-                                <p:cTn id="53" presetID="1" presetClass="entr" presetSubtype="0" fill="hold" nodeType="clickEffect">
-                                  <p:stCondLst>
-                                    <p:cond delay="0"/>
-                                  </p:stCondLst>
-                                  <p:childTnLst>
-                                    <p:set>
-                                      <p:cBhvr>
-                                        <p:cTn id="54" dur="1" fill="hold">
-                                          <p:stCondLst>
-                                            <p:cond delay="0"/>
-                                          </p:stCondLst>
-                                        </p:cTn>
-                                        <p:tgtEl>
-                                          <p:spTgt spid="3">
-                                            <p:txEl>
-                                              <p:pRg st="10" end="10"/>
-                                            </p:txEl>
-                                          </p:spTgt>
-                                        </p:tgtEl>
-                                        <p:attrNameLst>
-                                          <p:attrName>style.visibility</p:attrName>
-                                        </p:attrNameLst>
-                                      </p:cBhvr>
-                                      <p:to>
-                                        <p:strVal val="visible"/>
-                                      </p:to>
-                                    </p:set>
-                                  </p:childTnLst>
-                                </p:cTn>
-                              </p:par>
-                            </p:childTnLst>
-                          </p:cTn>
-                        </p:par>
-                      </p:childTnLst>
-                    </p:cTn>
-                  </p:par>
-                </p:childTnLst>
-              </p:cTn>
-              <p:prevCondLst>
-                <p:cond evt="onPrev" delay="0">
-                  <p:tgtEl>
-                    <p:sldTgt/>
-                  </p:tgtEl>
-                </p:cond>
-              </p:prevCondLst>
-              <p:nextCondLst>
-                <p:cond evt="onNext" delay="0">
-                  <p:tgtEl>
-                    <p:sldTgt/>
-                  </p:tgtEl>
-                </p:cond>
-              </p:nextCondLst>
-            </p:seq>
-          </p:childTnLst>
-        </p:cTn>
-      </p:par>
-    </p:tnLst>
-  </p:timing>
-</p:sld>
-</file>
-
 <file path=ppt/slides/slide2.xml><?xml version="1.0" encoding="utf-8"?>
 <p:sld xmlns:a="http://schemas.openxmlformats.org/drawingml/2006/main" xmlns:r="http://schemas.openxmlformats.org/officeDocument/2006/relationships" xmlns:p="http://schemas.openxmlformats.org/presentationml/2006/main">
   <p:cSld>
@@ -11064,7 +9451,7 @@
           <a:effectLst/>
           <a:extLst>
             <a:ext uri="{909E8E84-426E-40dd-AFC4-6F175D3DCCD1}">
-              <a14:hiddenFill xmlns="" xmlns:a14="http://schemas.microsoft.com/office/drawing/2010/main">
+              <a14:hiddenFill xmlns:a14="http://schemas.microsoft.com/office/drawing/2010/main" xmlns="">
                 <a:blipFill dpi="0" rotWithShape="0">
                   <a:blip/>
                   <a:srcRect/>
@@ -11075,7 +9462,7 @@
               </a14:hiddenFill>
             </a:ext>
             <a:ext uri="{91240B29-F687-4f45-9708-019B960494DF}">
-              <a14:hiddenLine xmlns="" xmlns:a14="http://schemas.microsoft.com/office/drawing/2010/main" w="9525">
+              <a14:hiddenLine xmlns:a14="http://schemas.microsoft.com/office/drawing/2010/main" xmlns="" w="9525">
                 <a:solidFill>
                   <a:srgbClr val="000000"/>
                 </a:solidFill>
@@ -11085,7 +9472,7 @@
               </a14:hiddenLine>
             </a:ext>
             <a:ext uri="{AF507438-7753-43e0-B8FC-AC1667EBCBE1}">
-              <a14:hiddenEffects xmlns="" xmlns:a14="http://schemas.microsoft.com/office/drawing/2010/main">
+              <a14:hiddenEffects xmlns:a14="http://schemas.microsoft.com/office/drawing/2010/main" xmlns="">
                 <a:effectLst>
                   <a:outerShdw blurRad="63500" dist="38099" dir="2700000" algn="ctr" rotWithShape="0">
                     <a:srgbClr val="000000">
@@ -11170,7 +9557,7 @@
           <a:effectLst/>
           <a:extLst>
             <a:ext uri="{909E8E84-426E-40dd-AFC4-6F175D3DCCD1}">
-              <a14:hiddenFill xmlns="" xmlns:a14="http://schemas.microsoft.com/office/drawing/2010/main">
+              <a14:hiddenFill xmlns:a14="http://schemas.microsoft.com/office/drawing/2010/main" xmlns="">
                 <a:blipFill dpi="0" rotWithShape="0">
                   <a:blip/>
                   <a:srcRect/>
@@ -11181,7 +9568,7 @@
               </a14:hiddenFill>
             </a:ext>
             <a:ext uri="{91240B29-F687-4f45-9708-019B960494DF}">
-              <a14:hiddenLine xmlns="" xmlns:a14="http://schemas.microsoft.com/office/drawing/2010/main" w="9525">
+              <a14:hiddenLine xmlns:a14="http://schemas.microsoft.com/office/drawing/2010/main" xmlns="" w="9525">
                 <a:solidFill>
                   <a:srgbClr val="000000"/>
                 </a:solidFill>
@@ -11191,7 +9578,7 @@
               </a14:hiddenLine>
             </a:ext>
             <a:ext uri="{AF507438-7753-43e0-B8FC-AC1667EBCBE1}">
-              <a14:hiddenEffects xmlns="" xmlns:a14="http://schemas.microsoft.com/office/drawing/2010/main">
+              <a14:hiddenEffects xmlns:a14="http://schemas.microsoft.com/office/drawing/2010/main" xmlns="">
                 <a:effectLst>
                   <a:outerShdw blurRad="63500" dist="38099" dir="2700000" algn="ctr" rotWithShape="0">
                     <a:srgbClr val="000000">
@@ -11246,7 +9633,7 @@
           <a:effectLst/>
           <a:extLst>
             <a:ext uri="{909E8E84-426E-40dd-AFC4-6F175D3DCCD1}">
-              <a14:hiddenFill xmlns="" xmlns:a14="http://schemas.microsoft.com/office/drawing/2010/main">
+              <a14:hiddenFill xmlns:a14="http://schemas.microsoft.com/office/drawing/2010/main" xmlns="">
                 <a:blipFill dpi="0" rotWithShape="0">
                   <a:blip/>
                   <a:srcRect/>
@@ -11257,7 +9644,7 @@
               </a14:hiddenFill>
             </a:ext>
             <a:ext uri="{91240B29-F687-4f45-9708-019B960494DF}">
-              <a14:hiddenLine xmlns="" xmlns:a14="http://schemas.microsoft.com/office/drawing/2010/main" w="9525">
+              <a14:hiddenLine xmlns:a14="http://schemas.microsoft.com/office/drawing/2010/main" xmlns="" w="9525">
                 <a:solidFill>
                   <a:srgbClr val="000000"/>
                 </a:solidFill>
@@ -11267,7 +9654,7 @@
               </a14:hiddenLine>
             </a:ext>
             <a:ext uri="{AF507438-7753-43e0-B8FC-AC1667EBCBE1}">
-              <a14:hiddenEffects xmlns="" xmlns:a14="http://schemas.microsoft.com/office/drawing/2010/main">
+              <a14:hiddenEffects xmlns:a14="http://schemas.microsoft.com/office/drawing/2010/main" xmlns="">
                 <a:effectLst>
                   <a:outerShdw blurRad="63500" dist="38099" dir="2700000" algn="ctr" rotWithShape="0">
                     <a:srgbClr val="000000">
@@ -11322,7 +9709,7 @@
           <a:effectLst/>
           <a:extLst>
             <a:ext uri="{909E8E84-426E-40dd-AFC4-6F175D3DCCD1}">
-              <a14:hiddenFill xmlns="" xmlns:a14="http://schemas.microsoft.com/office/drawing/2010/main">
+              <a14:hiddenFill xmlns:a14="http://schemas.microsoft.com/office/drawing/2010/main" xmlns="">
                 <a:blipFill dpi="0" rotWithShape="0">
                   <a:blip/>
                   <a:srcRect/>
@@ -11333,7 +9720,7 @@
               </a14:hiddenFill>
             </a:ext>
             <a:ext uri="{91240B29-F687-4f45-9708-019B960494DF}">
-              <a14:hiddenLine xmlns="" xmlns:a14="http://schemas.microsoft.com/office/drawing/2010/main" w="9525">
+              <a14:hiddenLine xmlns:a14="http://schemas.microsoft.com/office/drawing/2010/main" xmlns="" w="9525">
                 <a:solidFill>
                   <a:srgbClr val="000000"/>
                 </a:solidFill>
@@ -11343,7 +9730,7 @@
               </a14:hiddenLine>
             </a:ext>
             <a:ext uri="{AF507438-7753-43e0-B8FC-AC1667EBCBE1}">
-              <a14:hiddenEffects xmlns="" xmlns:a14="http://schemas.microsoft.com/office/drawing/2010/main">
+              <a14:hiddenEffects xmlns:a14="http://schemas.microsoft.com/office/drawing/2010/main" xmlns="">
                 <a:effectLst>
                   <a:outerShdw blurRad="63500" dist="38099" dir="2700000" algn="ctr" rotWithShape="0">
                     <a:srgbClr val="000000">
@@ -11398,7 +9785,7 @@
           <a:effectLst/>
           <a:extLst>
             <a:ext uri="{909E8E84-426E-40dd-AFC4-6F175D3DCCD1}">
-              <a14:hiddenFill xmlns="" xmlns:a14="http://schemas.microsoft.com/office/drawing/2010/main">
+              <a14:hiddenFill xmlns:a14="http://schemas.microsoft.com/office/drawing/2010/main" xmlns="">
                 <a:blipFill dpi="0" rotWithShape="0">
                   <a:blip/>
                   <a:srcRect/>
@@ -11409,7 +9796,7 @@
               </a14:hiddenFill>
             </a:ext>
             <a:ext uri="{91240B29-F687-4f45-9708-019B960494DF}">
-              <a14:hiddenLine xmlns="" xmlns:a14="http://schemas.microsoft.com/office/drawing/2010/main" w="9525">
+              <a14:hiddenLine xmlns:a14="http://schemas.microsoft.com/office/drawing/2010/main" xmlns="" w="9525">
                 <a:solidFill>
                   <a:srgbClr val="000000"/>
                 </a:solidFill>
@@ -11419,7 +9806,7 @@
               </a14:hiddenLine>
             </a:ext>
             <a:ext uri="{AF507438-7753-43e0-B8FC-AC1667EBCBE1}">
-              <a14:hiddenEffects xmlns="" xmlns:a14="http://schemas.microsoft.com/office/drawing/2010/main">
+              <a14:hiddenEffects xmlns:a14="http://schemas.microsoft.com/office/drawing/2010/main" xmlns="">
                 <a:effectLst>
                   <a:outerShdw blurRad="63500" dist="38099" dir="2700000" algn="ctr" rotWithShape="0">
                     <a:srgbClr val="000000">
@@ -11474,7 +9861,7 @@
           <a:effectLst/>
           <a:extLst>
             <a:ext uri="{909E8E84-426E-40dd-AFC4-6F175D3DCCD1}">
-              <a14:hiddenFill xmlns="" xmlns:a14="http://schemas.microsoft.com/office/drawing/2010/main">
+              <a14:hiddenFill xmlns:a14="http://schemas.microsoft.com/office/drawing/2010/main" xmlns="">
                 <a:blipFill dpi="0" rotWithShape="0">
                   <a:blip/>
                   <a:srcRect/>
@@ -11485,7 +9872,7 @@
               </a14:hiddenFill>
             </a:ext>
             <a:ext uri="{91240B29-F687-4f45-9708-019B960494DF}">
-              <a14:hiddenLine xmlns="" xmlns:a14="http://schemas.microsoft.com/office/drawing/2010/main" w="9525">
+              <a14:hiddenLine xmlns:a14="http://schemas.microsoft.com/office/drawing/2010/main" xmlns="" w="9525">
                 <a:solidFill>
                   <a:srgbClr val="000000"/>
                 </a:solidFill>
@@ -11495,7 +9882,7 @@
               </a14:hiddenLine>
             </a:ext>
             <a:ext uri="{AF507438-7753-43e0-B8FC-AC1667EBCBE1}">
-              <a14:hiddenEffects xmlns="" xmlns:a14="http://schemas.microsoft.com/office/drawing/2010/main">
+              <a14:hiddenEffects xmlns:a14="http://schemas.microsoft.com/office/drawing/2010/main" xmlns="">
                 <a:effectLst>
                   <a:outerShdw blurRad="63500" dist="38099" dir="2700000" algn="ctr" rotWithShape="0">
                     <a:srgbClr val="000000">
@@ -11550,7 +9937,7 @@
           <a:effectLst/>
           <a:extLst>
             <a:ext uri="{909E8E84-426E-40dd-AFC4-6F175D3DCCD1}">
-              <a14:hiddenFill xmlns="" xmlns:a14="http://schemas.microsoft.com/office/drawing/2010/main">
+              <a14:hiddenFill xmlns:a14="http://schemas.microsoft.com/office/drawing/2010/main" xmlns="">
                 <a:blipFill dpi="0" rotWithShape="0">
                   <a:blip/>
                   <a:srcRect/>
@@ -11561,7 +9948,7 @@
               </a14:hiddenFill>
             </a:ext>
             <a:ext uri="{91240B29-F687-4f45-9708-019B960494DF}">
-              <a14:hiddenLine xmlns="" xmlns:a14="http://schemas.microsoft.com/office/drawing/2010/main" w="9525">
+              <a14:hiddenLine xmlns:a14="http://schemas.microsoft.com/office/drawing/2010/main" xmlns="" w="9525">
                 <a:solidFill>
                   <a:srgbClr val="000000"/>
                 </a:solidFill>
@@ -11571,7 +9958,7 @@
               </a14:hiddenLine>
             </a:ext>
             <a:ext uri="{AF507438-7753-43e0-B8FC-AC1667EBCBE1}">
-              <a14:hiddenEffects xmlns="" xmlns:a14="http://schemas.microsoft.com/office/drawing/2010/main">
+              <a14:hiddenEffects xmlns:a14="http://schemas.microsoft.com/office/drawing/2010/main" xmlns="">
                 <a:effectLst>
                   <a:outerShdw blurRad="63500" dist="38099" dir="2700000" algn="ctr" rotWithShape="0">
                     <a:srgbClr val="000000">
@@ -11626,7 +10013,7 @@
           <a:effectLst/>
           <a:extLst>
             <a:ext uri="{909E8E84-426E-40dd-AFC4-6F175D3DCCD1}">
-              <a14:hiddenFill xmlns="" xmlns:a14="http://schemas.microsoft.com/office/drawing/2010/main">
+              <a14:hiddenFill xmlns:a14="http://schemas.microsoft.com/office/drawing/2010/main" xmlns="">
                 <a:blipFill dpi="0" rotWithShape="0">
                   <a:blip/>
                   <a:srcRect/>
@@ -11637,7 +10024,7 @@
               </a14:hiddenFill>
             </a:ext>
             <a:ext uri="{91240B29-F687-4f45-9708-019B960494DF}">
-              <a14:hiddenLine xmlns="" xmlns:a14="http://schemas.microsoft.com/office/drawing/2010/main" w="9525">
+              <a14:hiddenLine xmlns:a14="http://schemas.microsoft.com/office/drawing/2010/main" xmlns="" w="9525">
                 <a:solidFill>
                   <a:srgbClr val="000000"/>
                 </a:solidFill>
@@ -11647,7 +10034,7 @@
               </a14:hiddenLine>
             </a:ext>
             <a:ext uri="{AF507438-7753-43e0-B8FC-AC1667EBCBE1}">
-              <a14:hiddenEffects xmlns="" xmlns:a14="http://schemas.microsoft.com/office/drawing/2010/main">
+              <a14:hiddenEffects xmlns:a14="http://schemas.microsoft.com/office/drawing/2010/main" xmlns="">
                 <a:effectLst>
                   <a:outerShdw blurRad="63500" dist="38099" dir="2700000" algn="ctr" rotWithShape="0">
                     <a:srgbClr val="000000">
@@ -12670,7 +11057,7 @@
           <a:effectLst/>
           <a:extLst>
             <a:ext uri="{909E8E84-426E-40dd-AFC4-6F175D3DCCD1}">
-              <a14:hiddenFill xmlns="" xmlns:a14="http://schemas.microsoft.com/office/drawing/2010/main">
+              <a14:hiddenFill xmlns:a14="http://schemas.microsoft.com/office/drawing/2010/main" xmlns="">
                 <a:blipFill dpi="0" rotWithShape="0">
                   <a:blip/>
                   <a:srcRect/>
@@ -12681,7 +11068,7 @@
               </a14:hiddenFill>
             </a:ext>
             <a:ext uri="{91240B29-F687-4f45-9708-019B960494DF}">
-              <a14:hiddenLine xmlns="" xmlns:a14="http://schemas.microsoft.com/office/drawing/2010/main" w="9525">
+              <a14:hiddenLine xmlns:a14="http://schemas.microsoft.com/office/drawing/2010/main" xmlns="" w="9525">
                 <a:solidFill>
                   <a:srgbClr val="000000"/>
                 </a:solidFill>
@@ -12691,7 +11078,7 @@
               </a14:hiddenLine>
             </a:ext>
             <a:ext uri="{AF507438-7753-43e0-B8FC-AC1667EBCBE1}">
-              <a14:hiddenEffects xmlns="" xmlns:a14="http://schemas.microsoft.com/office/drawing/2010/main">
+              <a14:hiddenEffects xmlns:a14="http://schemas.microsoft.com/office/drawing/2010/main" xmlns="">
                 <a:effectLst>
                   <a:outerShdw blurRad="63500" dist="38099" dir="2700000" algn="ctr" rotWithShape="0">
                     <a:srgbClr val="000000">
@@ -12746,7 +11133,7 @@
           <a:effectLst/>
           <a:extLst>
             <a:ext uri="{909E8E84-426E-40dd-AFC4-6F175D3DCCD1}">
-              <a14:hiddenFill xmlns="" xmlns:a14="http://schemas.microsoft.com/office/drawing/2010/main">
+              <a14:hiddenFill xmlns:a14="http://schemas.microsoft.com/office/drawing/2010/main" xmlns="">
                 <a:blipFill dpi="0" rotWithShape="0">
                   <a:blip/>
                   <a:srcRect/>
@@ -12757,7 +11144,7 @@
               </a14:hiddenFill>
             </a:ext>
             <a:ext uri="{91240B29-F687-4f45-9708-019B960494DF}">
-              <a14:hiddenLine xmlns="" xmlns:a14="http://schemas.microsoft.com/office/drawing/2010/main" w="9525">
+              <a14:hiddenLine xmlns:a14="http://schemas.microsoft.com/office/drawing/2010/main" xmlns="" w="9525">
                 <a:solidFill>
                   <a:srgbClr val="000000"/>
                 </a:solidFill>
@@ -12767,7 +11154,7 @@
               </a14:hiddenLine>
             </a:ext>
             <a:ext uri="{AF507438-7753-43e0-B8FC-AC1667EBCBE1}">
-              <a14:hiddenEffects xmlns="" xmlns:a14="http://schemas.microsoft.com/office/drawing/2010/main">
+              <a14:hiddenEffects xmlns:a14="http://schemas.microsoft.com/office/drawing/2010/main" xmlns="">
                 <a:effectLst>
                   <a:outerShdw blurRad="63500" dist="38099" dir="2700000" algn="ctr" rotWithShape="0">
                     <a:srgbClr val="000000">
@@ -12822,7 +11209,7 @@
           <a:effectLst/>
           <a:extLst>
             <a:ext uri="{909E8E84-426E-40dd-AFC4-6F175D3DCCD1}">
-              <a14:hiddenFill xmlns="" xmlns:a14="http://schemas.microsoft.com/office/drawing/2010/main">
+              <a14:hiddenFill xmlns:a14="http://schemas.microsoft.com/office/drawing/2010/main" xmlns="">
                 <a:blipFill dpi="0" rotWithShape="0">
                   <a:blip/>
                   <a:srcRect/>
@@ -12833,7 +11220,7 @@
               </a14:hiddenFill>
             </a:ext>
             <a:ext uri="{91240B29-F687-4f45-9708-019B960494DF}">
-              <a14:hiddenLine xmlns="" xmlns:a14="http://schemas.microsoft.com/office/drawing/2010/main" w="9525">
+              <a14:hiddenLine xmlns:a14="http://schemas.microsoft.com/office/drawing/2010/main" xmlns="" w="9525">
                 <a:solidFill>
                   <a:srgbClr val="000000"/>
                 </a:solidFill>
@@ -12843,7 +11230,7 @@
               </a14:hiddenLine>
             </a:ext>
             <a:ext uri="{AF507438-7753-43e0-B8FC-AC1667EBCBE1}">
-              <a14:hiddenEffects xmlns="" xmlns:a14="http://schemas.microsoft.com/office/drawing/2010/main">
+              <a14:hiddenEffects xmlns:a14="http://schemas.microsoft.com/office/drawing/2010/main" xmlns="">
                 <a:effectLst>
                   <a:outerShdw blurRad="63500" dist="38099" dir="2700000" algn="ctr" rotWithShape="0">
                     <a:srgbClr val="000000">
@@ -12898,7 +11285,7 @@
           <a:effectLst/>
           <a:extLst>
             <a:ext uri="{909E8E84-426E-40dd-AFC4-6F175D3DCCD1}">
-              <a14:hiddenFill xmlns="" xmlns:a14="http://schemas.microsoft.com/office/drawing/2010/main">
+              <a14:hiddenFill xmlns:a14="http://schemas.microsoft.com/office/drawing/2010/main" xmlns="">
                 <a:blipFill dpi="0" rotWithShape="0">
                   <a:blip/>
                   <a:srcRect/>
@@ -12909,7 +11296,7 @@
               </a14:hiddenFill>
             </a:ext>
             <a:ext uri="{91240B29-F687-4f45-9708-019B960494DF}">
-              <a14:hiddenLine xmlns="" xmlns:a14="http://schemas.microsoft.com/office/drawing/2010/main" w="9525">
+              <a14:hiddenLine xmlns:a14="http://schemas.microsoft.com/office/drawing/2010/main" xmlns="" w="9525">
                 <a:solidFill>
                   <a:srgbClr val="000000"/>
                 </a:solidFill>
@@ -12919,7 +11306,7 @@
               </a14:hiddenLine>
             </a:ext>
             <a:ext uri="{AF507438-7753-43e0-B8FC-AC1667EBCBE1}">
-              <a14:hiddenEffects xmlns="" xmlns:a14="http://schemas.microsoft.com/office/drawing/2010/main">
+              <a14:hiddenEffects xmlns:a14="http://schemas.microsoft.com/office/drawing/2010/main" xmlns="">
                 <a:effectLst>
                   <a:outerShdw blurRad="63500" dist="38099" dir="2700000" algn="ctr" rotWithShape="0">
                     <a:srgbClr val="000000">
@@ -12974,7 +11361,7 @@
           <a:effectLst/>
           <a:extLst>
             <a:ext uri="{909E8E84-426E-40dd-AFC4-6F175D3DCCD1}">
-              <a14:hiddenFill xmlns="" xmlns:a14="http://schemas.microsoft.com/office/drawing/2010/main">
+              <a14:hiddenFill xmlns:a14="http://schemas.microsoft.com/office/drawing/2010/main" xmlns="">
                 <a:blipFill dpi="0" rotWithShape="0">
                   <a:blip/>
                   <a:srcRect/>
@@ -12985,7 +11372,7 @@
               </a14:hiddenFill>
             </a:ext>
             <a:ext uri="{91240B29-F687-4f45-9708-019B960494DF}">
-              <a14:hiddenLine xmlns="" xmlns:a14="http://schemas.microsoft.com/office/drawing/2010/main" w="9525">
+              <a14:hiddenLine xmlns:a14="http://schemas.microsoft.com/office/drawing/2010/main" xmlns="" w="9525">
                 <a:solidFill>
                   <a:srgbClr val="000000"/>
                 </a:solidFill>
@@ -12995,7 +11382,7 @@
               </a14:hiddenLine>
             </a:ext>
             <a:ext uri="{AF507438-7753-43e0-B8FC-AC1667EBCBE1}">
-              <a14:hiddenEffects xmlns="" xmlns:a14="http://schemas.microsoft.com/office/drawing/2010/main">
+              <a14:hiddenEffects xmlns:a14="http://schemas.microsoft.com/office/drawing/2010/main" xmlns="">
                 <a:effectLst>
                   <a:outerShdw blurRad="63500" dist="38099" dir="2700000" algn="ctr" rotWithShape="0">
                     <a:srgbClr val="000000">
@@ -13050,7 +11437,7 @@
           <a:effectLst/>
           <a:extLst>
             <a:ext uri="{909E8E84-426E-40dd-AFC4-6F175D3DCCD1}">
-              <a14:hiddenFill xmlns="" xmlns:a14="http://schemas.microsoft.com/office/drawing/2010/main">
+              <a14:hiddenFill xmlns:a14="http://schemas.microsoft.com/office/drawing/2010/main" xmlns="">
                 <a:blipFill dpi="0" rotWithShape="0">
                   <a:blip/>
                   <a:srcRect/>
@@ -13061,7 +11448,7 @@
               </a14:hiddenFill>
             </a:ext>
             <a:ext uri="{91240B29-F687-4f45-9708-019B960494DF}">
-              <a14:hiddenLine xmlns="" xmlns:a14="http://schemas.microsoft.com/office/drawing/2010/main" w="9525">
+              <a14:hiddenLine xmlns:a14="http://schemas.microsoft.com/office/drawing/2010/main" xmlns="" w="9525">
                 <a:solidFill>
                   <a:srgbClr val="000000"/>
                 </a:solidFill>
@@ -13071,7 +11458,7 @@
               </a14:hiddenLine>
             </a:ext>
             <a:ext uri="{AF507438-7753-43e0-B8FC-AC1667EBCBE1}">
-              <a14:hiddenEffects xmlns="" xmlns:a14="http://schemas.microsoft.com/office/drawing/2010/main">
+              <a14:hiddenEffects xmlns:a14="http://schemas.microsoft.com/office/drawing/2010/main" xmlns="">
                 <a:effectLst>
                   <a:outerShdw blurRad="63500" dist="38099" dir="2700000" algn="ctr" rotWithShape="0">
                     <a:srgbClr val="000000">
@@ -13126,7 +11513,7 @@
           <a:effectLst/>
           <a:extLst>
             <a:ext uri="{909E8E84-426E-40dd-AFC4-6F175D3DCCD1}">
-              <a14:hiddenFill xmlns="" xmlns:a14="http://schemas.microsoft.com/office/drawing/2010/main">
+              <a14:hiddenFill xmlns:a14="http://schemas.microsoft.com/office/drawing/2010/main" xmlns="">
                 <a:blipFill dpi="0" rotWithShape="0">
                   <a:blip/>
                   <a:srcRect/>
@@ -13137,7 +11524,7 @@
               </a14:hiddenFill>
             </a:ext>
             <a:ext uri="{91240B29-F687-4f45-9708-019B960494DF}">
-              <a14:hiddenLine xmlns="" xmlns:a14="http://schemas.microsoft.com/office/drawing/2010/main" w="9525">
+              <a14:hiddenLine xmlns:a14="http://schemas.microsoft.com/office/drawing/2010/main" xmlns="" w="9525">
                 <a:solidFill>
                   <a:srgbClr val="000000"/>
                 </a:solidFill>
@@ -13147,7 +11534,7 @@
               </a14:hiddenLine>
             </a:ext>
             <a:ext uri="{AF507438-7753-43e0-B8FC-AC1667EBCBE1}">
-              <a14:hiddenEffects xmlns="" xmlns:a14="http://schemas.microsoft.com/office/drawing/2010/main">
+              <a14:hiddenEffects xmlns:a14="http://schemas.microsoft.com/office/drawing/2010/main" xmlns="">
                 <a:effectLst>
                   <a:outerShdw blurRad="63500" dist="38099" dir="2700000" algn="ctr" rotWithShape="0">
                     <a:srgbClr val="000000">
@@ -13202,7 +11589,7 @@
           <a:effectLst/>
           <a:extLst>
             <a:ext uri="{909E8E84-426E-40dd-AFC4-6F175D3DCCD1}">
-              <a14:hiddenFill xmlns="" xmlns:a14="http://schemas.microsoft.com/office/drawing/2010/main">
+              <a14:hiddenFill xmlns:a14="http://schemas.microsoft.com/office/drawing/2010/main" xmlns="">
                 <a:blipFill dpi="0" rotWithShape="0">
                   <a:blip/>
                   <a:srcRect/>
@@ -13213,7 +11600,7 @@
               </a14:hiddenFill>
             </a:ext>
             <a:ext uri="{91240B29-F687-4f45-9708-019B960494DF}">
-              <a14:hiddenLine xmlns="" xmlns:a14="http://schemas.microsoft.com/office/drawing/2010/main" w="9525">
+              <a14:hiddenLine xmlns:a14="http://schemas.microsoft.com/office/drawing/2010/main" xmlns="" w="9525">
                 <a:solidFill>
                   <a:srgbClr val="000000"/>
                 </a:solidFill>
@@ -13223,7 +11610,7 @@
               </a14:hiddenLine>
             </a:ext>
             <a:ext uri="{AF507438-7753-43e0-B8FC-AC1667EBCBE1}">
-              <a14:hiddenEffects xmlns="" xmlns:a14="http://schemas.microsoft.com/office/drawing/2010/main">
+              <a14:hiddenEffects xmlns:a14="http://schemas.microsoft.com/office/drawing/2010/main" xmlns="">
                 <a:effectLst>
                   <a:outerShdw blurRad="63500" dist="38099" dir="2700000" algn="ctr" rotWithShape="0">
                     <a:srgbClr val="000000">
@@ -16655,1801 +15042,6 @@
       <p:bldP spid="66" grpId="0"/>
       <p:bldP spid="74" grpId="0"/>
     </p:bldLst>
-  </p:timing>
-</p:sld>
-</file>
-
-<file path=ppt/slides/slide20.xml><?xml version="1.0" encoding="utf-8"?>
-<p:sld xmlns:a="http://schemas.openxmlformats.org/drawingml/2006/main" xmlns:r="http://schemas.openxmlformats.org/officeDocument/2006/relationships" xmlns:p="http://schemas.openxmlformats.org/presentationml/2006/main">
-  <p:cSld>
-    <p:spTree>
-      <p:nvGrpSpPr>
-        <p:cNvPr id="1" name=""/>
-        <p:cNvGrpSpPr/>
-        <p:nvPr/>
-      </p:nvGrpSpPr>
-      <p:grpSpPr>
-        <a:xfrm>
-          <a:off x="0" y="0"/>
-          <a:ext cx="0" cy="0"/>
-          <a:chOff x="0" y="0"/>
-          <a:chExt cx="0" cy="0"/>
-        </a:xfrm>
-      </p:grpSpPr>
-      <p:sp>
-        <p:nvSpPr>
-          <p:cNvPr id="2" name="Title 1">
-            <a:extLst>
-              <a:ext uri="{FF2B5EF4-FFF2-40B4-BE49-F238E27FC236}">
-                <a16:creationId xmlns:a16="http://schemas.microsoft.com/office/drawing/2014/main" id="{02FC3B3A-EB20-B128-B6CC-B4EA7CC05697}"/>
-              </a:ext>
-            </a:extLst>
-          </p:cNvPr>
-          <p:cNvSpPr>
-            <a:spLocks noGrp="1"/>
-          </p:cNvSpPr>
-          <p:nvPr>
-            <p:ph type="title"/>
-          </p:nvPr>
-        </p:nvSpPr>
-        <p:spPr/>
-        <p:txBody>
-          <a:bodyPr/>
-          <a:lstStyle/>
-          <a:p>
-            <a:r>
-              <a:rPr lang="en-US" dirty="0"/>
-              <a:t>More examples of using map-reduce</a:t>
-            </a:r>
-          </a:p>
-        </p:txBody>
-      </p:sp>
-      <p:sp>
-        <p:nvSpPr>
-          <p:cNvPr id="3" name="Content Placeholder 2">
-            <a:extLst>
-              <a:ext uri="{FF2B5EF4-FFF2-40B4-BE49-F238E27FC236}">
-                <a16:creationId xmlns:a16="http://schemas.microsoft.com/office/drawing/2014/main" id="{0ED433C1-B8FF-583C-F5A7-D7DF21F68A30}"/>
-              </a:ext>
-            </a:extLst>
-          </p:cNvPr>
-          <p:cNvSpPr>
-            <a:spLocks noGrp="1"/>
-          </p:cNvSpPr>
-          <p:nvPr>
-            <p:ph idx="1"/>
-          </p:nvPr>
-        </p:nvSpPr>
-        <p:spPr/>
-        <p:txBody>
-          <a:bodyPr/>
-          <a:lstStyle/>
-          <a:p>
-            <a:r>
-              <a:rPr lang="en-US" dirty="0"/>
-              <a:t>Database Joins</a:t>
-            </a:r>
-          </a:p>
-          <a:p>
-            <a:pPr lvl="1"/>
-            <a:r>
-              <a:rPr lang="en-US" dirty="0"/>
-              <a:t>Example: user activity (e.g. URLs) with user information (e.g. age)</a:t>
-            </a:r>
-          </a:p>
-          <a:p>
-            <a:r>
-              <a:rPr lang="en-US" dirty="0"/>
-              <a:t>Grouping (GROUPBY) aggregations: </a:t>
-            </a:r>
-          </a:p>
-          <a:p>
-            <a:pPr lvl="1"/>
-            <a:r>
-              <a:rPr lang="en-US" dirty="0"/>
-              <a:t>Count, sum, </a:t>
-            </a:r>
-            <a:r>
-              <a:rPr lang="en-US" dirty="0" err="1"/>
-              <a:t>etc</a:t>
-            </a:r>
-            <a:endParaRPr lang="en-US" dirty="0"/>
-          </a:p>
-          <a:p>
-            <a:pPr lvl="1"/>
-            <a:r>
-              <a:rPr lang="en-US" dirty="0"/>
-              <a:t>Creating the sequence of events in a user session, determining whether e.g. a new version of a web page resulted in better sales</a:t>
-            </a:r>
-          </a:p>
-          <a:p>
-            <a:r>
-              <a:rPr lang="en-US" dirty="0"/>
-              <a:t>Large distributed sorting</a:t>
-            </a:r>
-          </a:p>
-          <a:p>
-            <a:r>
-              <a:rPr lang="en-US" dirty="0"/>
-              <a:t>Output sorting after mapper: important!</a:t>
-            </a:r>
-          </a:p>
-        </p:txBody>
-      </p:sp>
-      <p:pic>
-        <p:nvPicPr>
-          <p:cNvPr id="5" name="Picture 4" descr="A diagram of a diagram&#10;&#10;AI-generated content may be incorrect.">
-            <a:extLst>
-              <a:ext uri="{FF2B5EF4-FFF2-40B4-BE49-F238E27FC236}">
-                <a16:creationId xmlns:a16="http://schemas.microsoft.com/office/drawing/2014/main" id="{535A21A8-14F6-EC23-458A-61CC32945E45}"/>
-              </a:ext>
-            </a:extLst>
-          </p:cNvPr>
-          <p:cNvPicPr>
-            <a:picLocks noChangeAspect="1"/>
-          </p:cNvPicPr>
-          <p:nvPr/>
-        </p:nvPicPr>
-        <p:blipFill>
-          <a:blip r:embed="rId2"/>
-          <a:stretch>
-            <a:fillRect/>
-          </a:stretch>
-        </p:blipFill>
-        <p:spPr>
-          <a:xfrm>
-            <a:off x="8580475" y="4438945"/>
-            <a:ext cx="2419055" cy="2419055"/>
-          </a:xfrm>
-          <a:prstGeom prst="rect">
-            <a:avLst/>
-          </a:prstGeom>
-        </p:spPr>
-      </p:pic>
-    </p:spTree>
-    <p:extLst>
-      <p:ext uri="{BB962C8B-B14F-4D97-AF65-F5344CB8AC3E}">
-        <p14:creationId xmlns:p14="http://schemas.microsoft.com/office/powerpoint/2010/main" val="1887913451"/>
-      </p:ext>
-    </p:extLst>
-  </p:cSld>
-  <p:clrMapOvr>
-    <a:masterClrMapping/>
-  </p:clrMapOvr>
-  <p:timing>
-    <p:tnLst>
-      <p:par>
-        <p:cTn id="1" dur="indefinite" restart="never" nodeType="tmRoot">
-          <p:childTnLst>
-            <p:seq concurrent="1" nextAc="seek">
-              <p:cTn id="2" dur="indefinite" nodeType="mainSeq">
-                <p:childTnLst>
-                  <p:par>
-                    <p:cTn id="3" fill="hold">
-                      <p:stCondLst>
-                        <p:cond delay="indefinite"/>
-                      </p:stCondLst>
-                      <p:childTnLst>
-                        <p:par>
-                          <p:cTn id="4" fill="hold">
-                            <p:stCondLst>
-                              <p:cond delay="0"/>
-                            </p:stCondLst>
-                            <p:childTnLst>
-                              <p:par>
-                                <p:cTn id="5" presetID="1" presetClass="entr" presetSubtype="0" fill="hold" nodeType="clickEffect">
-                                  <p:stCondLst>
-                                    <p:cond delay="0"/>
-                                  </p:stCondLst>
-                                  <p:childTnLst>
-                                    <p:set>
-                                      <p:cBhvr>
-                                        <p:cTn id="6" dur="1" fill="hold">
-                                          <p:stCondLst>
-                                            <p:cond delay="0"/>
-                                          </p:stCondLst>
-                                        </p:cTn>
-                                        <p:tgtEl>
-                                          <p:spTgt spid="3">
-                                            <p:txEl>
-                                              <p:pRg st="0" end="0"/>
-                                            </p:txEl>
-                                          </p:spTgt>
-                                        </p:tgtEl>
-                                        <p:attrNameLst>
-                                          <p:attrName>style.visibility</p:attrName>
-                                        </p:attrNameLst>
-                                      </p:cBhvr>
-                                      <p:to>
-                                        <p:strVal val="visible"/>
-                                      </p:to>
-                                    </p:set>
-                                  </p:childTnLst>
-                                </p:cTn>
-                              </p:par>
-                            </p:childTnLst>
-                          </p:cTn>
-                        </p:par>
-                      </p:childTnLst>
-                    </p:cTn>
-                  </p:par>
-                  <p:par>
-                    <p:cTn id="7" fill="hold">
-                      <p:stCondLst>
-                        <p:cond delay="indefinite"/>
-                      </p:stCondLst>
-                      <p:childTnLst>
-                        <p:par>
-                          <p:cTn id="8" fill="hold">
-                            <p:stCondLst>
-                              <p:cond delay="0"/>
-                            </p:stCondLst>
-                            <p:childTnLst>
-                              <p:par>
-                                <p:cTn id="9" presetID="1" presetClass="entr" presetSubtype="0" fill="hold" nodeType="clickEffect">
-                                  <p:stCondLst>
-                                    <p:cond delay="0"/>
-                                  </p:stCondLst>
-                                  <p:childTnLst>
-                                    <p:set>
-                                      <p:cBhvr>
-                                        <p:cTn id="10" dur="1" fill="hold">
-                                          <p:stCondLst>
-                                            <p:cond delay="0"/>
-                                          </p:stCondLst>
-                                        </p:cTn>
-                                        <p:tgtEl>
-                                          <p:spTgt spid="3">
-                                            <p:txEl>
-                                              <p:pRg st="1" end="1"/>
-                                            </p:txEl>
-                                          </p:spTgt>
-                                        </p:tgtEl>
-                                        <p:attrNameLst>
-                                          <p:attrName>style.visibility</p:attrName>
-                                        </p:attrNameLst>
-                                      </p:cBhvr>
-                                      <p:to>
-                                        <p:strVal val="visible"/>
-                                      </p:to>
-                                    </p:set>
-                                  </p:childTnLst>
-                                </p:cTn>
-                              </p:par>
-                            </p:childTnLst>
-                          </p:cTn>
-                        </p:par>
-                      </p:childTnLst>
-                    </p:cTn>
-                  </p:par>
-                  <p:par>
-                    <p:cTn id="11" fill="hold">
-                      <p:stCondLst>
-                        <p:cond delay="indefinite"/>
-                      </p:stCondLst>
-                      <p:childTnLst>
-                        <p:par>
-                          <p:cTn id="12" fill="hold">
-                            <p:stCondLst>
-                              <p:cond delay="0"/>
-                            </p:stCondLst>
-                            <p:childTnLst>
-                              <p:par>
-                                <p:cTn id="13" presetID="1" presetClass="entr" presetSubtype="0" fill="hold" nodeType="clickEffect">
-                                  <p:stCondLst>
-                                    <p:cond delay="0"/>
-                                  </p:stCondLst>
-                                  <p:childTnLst>
-                                    <p:set>
-                                      <p:cBhvr>
-                                        <p:cTn id="14" dur="1" fill="hold">
-                                          <p:stCondLst>
-                                            <p:cond delay="0"/>
-                                          </p:stCondLst>
-                                        </p:cTn>
-                                        <p:tgtEl>
-                                          <p:spTgt spid="3">
-                                            <p:txEl>
-                                              <p:pRg st="2" end="2"/>
-                                            </p:txEl>
-                                          </p:spTgt>
-                                        </p:tgtEl>
-                                        <p:attrNameLst>
-                                          <p:attrName>style.visibility</p:attrName>
-                                        </p:attrNameLst>
-                                      </p:cBhvr>
-                                      <p:to>
-                                        <p:strVal val="visible"/>
-                                      </p:to>
-                                    </p:set>
-                                  </p:childTnLst>
-                                </p:cTn>
-                              </p:par>
-                            </p:childTnLst>
-                          </p:cTn>
-                        </p:par>
-                      </p:childTnLst>
-                    </p:cTn>
-                  </p:par>
-                  <p:par>
-                    <p:cTn id="15" fill="hold">
-                      <p:stCondLst>
-                        <p:cond delay="indefinite"/>
-                      </p:stCondLst>
-                      <p:childTnLst>
-                        <p:par>
-                          <p:cTn id="16" fill="hold">
-                            <p:stCondLst>
-                              <p:cond delay="0"/>
-                            </p:stCondLst>
-                            <p:childTnLst>
-                              <p:par>
-                                <p:cTn id="17" presetID="1" presetClass="entr" presetSubtype="0" fill="hold" nodeType="clickEffect">
-                                  <p:stCondLst>
-                                    <p:cond delay="0"/>
-                                  </p:stCondLst>
-                                  <p:childTnLst>
-                                    <p:set>
-                                      <p:cBhvr>
-                                        <p:cTn id="18" dur="1" fill="hold">
-                                          <p:stCondLst>
-                                            <p:cond delay="0"/>
-                                          </p:stCondLst>
-                                        </p:cTn>
-                                        <p:tgtEl>
-                                          <p:spTgt spid="3">
-                                            <p:txEl>
-                                              <p:pRg st="3" end="3"/>
-                                            </p:txEl>
-                                          </p:spTgt>
-                                        </p:tgtEl>
-                                        <p:attrNameLst>
-                                          <p:attrName>style.visibility</p:attrName>
-                                        </p:attrNameLst>
-                                      </p:cBhvr>
-                                      <p:to>
-                                        <p:strVal val="visible"/>
-                                      </p:to>
-                                    </p:set>
-                                  </p:childTnLst>
-                                </p:cTn>
-                              </p:par>
-                            </p:childTnLst>
-                          </p:cTn>
-                        </p:par>
-                      </p:childTnLst>
-                    </p:cTn>
-                  </p:par>
-                  <p:par>
-                    <p:cTn id="19" fill="hold">
-                      <p:stCondLst>
-                        <p:cond delay="indefinite"/>
-                      </p:stCondLst>
-                      <p:childTnLst>
-                        <p:par>
-                          <p:cTn id="20" fill="hold">
-                            <p:stCondLst>
-                              <p:cond delay="0"/>
-                            </p:stCondLst>
-                            <p:childTnLst>
-                              <p:par>
-                                <p:cTn id="21" presetID="1" presetClass="entr" presetSubtype="0" fill="hold" nodeType="clickEffect">
-                                  <p:stCondLst>
-                                    <p:cond delay="0"/>
-                                  </p:stCondLst>
-                                  <p:childTnLst>
-                                    <p:set>
-                                      <p:cBhvr>
-                                        <p:cTn id="22" dur="1" fill="hold">
-                                          <p:stCondLst>
-                                            <p:cond delay="0"/>
-                                          </p:stCondLst>
-                                        </p:cTn>
-                                        <p:tgtEl>
-                                          <p:spTgt spid="3">
-                                            <p:txEl>
-                                              <p:pRg st="4" end="4"/>
-                                            </p:txEl>
-                                          </p:spTgt>
-                                        </p:tgtEl>
-                                        <p:attrNameLst>
-                                          <p:attrName>style.visibility</p:attrName>
-                                        </p:attrNameLst>
-                                      </p:cBhvr>
-                                      <p:to>
-                                        <p:strVal val="visible"/>
-                                      </p:to>
-                                    </p:set>
-                                  </p:childTnLst>
-                                </p:cTn>
-                              </p:par>
-                            </p:childTnLst>
-                          </p:cTn>
-                        </p:par>
-                      </p:childTnLst>
-                    </p:cTn>
-                  </p:par>
-                  <p:par>
-                    <p:cTn id="23" fill="hold">
-                      <p:stCondLst>
-                        <p:cond delay="indefinite"/>
-                      </p:stCondLst>
-                      <p:childTnLst>
-                        <p:par>
-                          <p:cTn id="24" fill="hold">
-                            <p:stCondLst>
-                              <p:cond delay="0"/>
-                            </p:stCondLst>
-                            <p:childTnLst>
-                              <p:par>
-                                <p:cTn id="25" presetID="1" presetClass="entr" presetSubtype="0" fill="hold" nodeType="clickEffect">
-                                  <p:stCondLst>
-                                    <p:cond delay="0"/>
-                                  </p:stCondLst>
-                                  <p:childTnLst>
-                                    <p:set>
-                                      <p:cBhvr>
-                                        <p:cTn id="26" dur="1" fill="hold">
-                                          <p:stCondLst>
-                                            <p:cond delay="0"/>
-                                          </p:stCondLst>
-                                        </p:cTn>
-                                        <p:tgtEl>
-                                          <p:spTgt spid="3">
-                                            <p:txEl>
-                                              <p:pRg st="5" end="5"/>
-                                            </p:txEl>
-                                          </p:spTgt>
-                                        </p:tgtEl>
-                                        <p:attrNameLst>
-                                          <p:attrName>style.visibility</p:attrName>
-                                        </p:attrNameLst>
-                                      </p:cBhvr>
-                                      <p:to>
-                                        <p:strVal val="visible"/>
-                                      </p:to>
-                                    </p:set>
-                                  </p:childTnLst>
-                                </p:cTn>
-                              </p:par>
-                            </p:childTnLst>
-                          </p:cTn>
-                        </p:par>
-                      </p:childTnLst>
-                    </p:cTn>
-                  </p:par>
-                  <p:par>
-                    <p:cTn id="27" fill="hold">
-                      <p:stCondLst>
-                        <p:cond delay="indefinite"/>
-                      </p:stCondLst>
-                      <p:childTnLst>
-                        <p:par>
-                          <p:cTn id="28" fill="hold">
-                            <p:stCondLst>
-                              <p:cond delay="0"/>
-                            </p:stCondLst>
-                            <p:childTnLst>
-                              <p:par>
-                                <p:cTn id="29" presetID="1" presetClass="entr" presetSubtype="0" fill="hold" nodeType="clickEffect">
-                                  <p:stCondLst>
-                                    <p:cond delay="0"/>
-                                  </p:stCondLst>
-                                  <p:childTnLst>
-                                    <p:set>
-                                      <p:cBhvr>
-                                        <p:cTn id="30" dur="1" fill="hold">
-                                          <p:stCondLst>
-                                            <p:cond delay="0"/>
-                                          </p:stCondLst>
-                                        </p:cTn>
-                                        <p:tgtEl>
-                                          <p:spTgt spid="3">
-                                            <p:txEl>
-                                              <p:pRg st="6" end="6"/>
-                                            </p:txEl>
-                                          </p:spTgt>
-                                        </p:tgtEl>
-                                        <p:attrNameLst>
-                                          <p:attrName>style.visibility</p:attrName>
-                                        </p:attrNameLst>
-                                      </p:cBhvr>
-                                      <p:to>
-                                        <p:strVal val="visible"/>
-                                      </p:to>
-                                    </p:set>
-                                  </p:childTnLst>
-                                </p:cTn>
-                              </p:par>
-                            </p:childTnLst>
-                          </p:cTn>
-                        </p:par>
-                      </p:childTnLst>
-                    </p:cTn>
-                  </p:par>
-                </p:childTnLst>
-              </p:cTn>
-              <p:prevCondLst>
-                <p:cond evt="onPrev" delay="0">
-                  <p:tgtEl>
-                    <p:sldTgt/>
-                  </p:tgtEl>
-                </p:cond>
-              </p:prevCondLst>
-              <p:nextCondLst>
-                <p:cond evt="onNext" delay="0">
-                  <p:tgtEl>
-                    <p:sldTgt/>
-                  </p:tgtEl>
-                </p:cond>
-              </p:nextCondLst>
-            </p:seq>
-          </p:childTnLst>
-        </p:cTn>
-      </p:par>
-    </p:tnLst>
-  </p:timing>
-</p:sld>
-</file>
-
-<file path=ppt/slides/slide21.xml><?xml version="1.0" encoding="utf-8"?>
-<p:sld xmlns:a="http://schemas.openxmlformats.org/drawingml/2006/main" xmlns:r="http://schemas.openxmlformats.org/officeDocument/2006/relationships" xmlns:p="http://schemas.openxmlformats.org/presentationml/2006/main">
-  <p:cSld>
-    <p:spTree>
-      <p:nvGrpSpPr>
-        <p:cNvPr id="1" name=""/>
-        <p:cNvGrpSpPr/>
-        <p:nvPr/>
-      </p:nvGrpSpPr>
-      <p:grpSpPr>
-        <a:xfrm>
-          <a:off x="0" y="0"/>
-          <a:ext cx="0" cy="0"/>
-          <a:chOff x="0" y="0"/>
-          <a:chExt cx="0" cy="0"/>
-        </a:xfrm>
-      </p:grpSpPr>
-      <p:sp>
-        <p:nvSpPr>
-          <p:cNvPr id="2" name="Title 1">
-            <a:extLst>
-              <a:ext uri="{FF2B5EF4-FFF2-40B4-BE49-F238E27FC236}">
-                <a16:creationId xmlns:a16="http://schemas.microsoft.com/office/drawing/2014/main" id="{A26A446E-34C3-CE44-064C-2EB5F36EBBAD}"/>
-              </a:ext>
-            </a:extLst>
-          </p:cNvPr>
-          <p:cNvSpPr>
-            <a:spLocks noGrp="1"/>
-          </p:cNvSpPr>
-          <p:nvPr>
-            <p:ph type="title"/>
-          </p:nvPr>
-        </p:nvSpPr>
-        <p:spPr/>
-        <p:txBody>
-          <a:bodyPr/>
-          <a:lstStyle/>
-          <a:p>
-            <a:r>
-              <a:rPr lang="en-US" dirty="0"/>
-              <a:t>Building on Map-Reduce: (1) </a:t>
-            </a:r>
-            <a:r>
-              <a:rPr lang="en-US" dirty="0">
-                <a:solidFill>
-                  <a:srgbClr val="C00000"/>
-                </a:solidFill>
-              </a:rPr>
-              <a:t>Workflows</a:t>
-            </a:r>
-          </a:p>
-        </p:txBody>
-      </p:sp>
-      <p:sp>
-        <p:nvSpPr>
-          <p:cNvPr id="3" name="Content Placeholder 2">
-            <a:extLst>
-              <a:ext uri="{FF2B5EF4-FFF2-40B4-BE49-F238E27FC236}">
-                <a16:creationId xmlns:a16="http://schemas.microsoft.com/office/drawing/2014/main" id="{6DEEA059-B047-78C5-4BB2-54D1560ABF9D}"/>
-              </a:ext>
-            </a:extLst>
-          </p:cNvPr>
-          <p:cNvSpPr>
-            <a:spLocks noGrp="1"/>
-          </p:cNvSpPr>
-          <p:nvPr>
-            <p:ph idx="1"/>
-          </p:nvPr>
-        </p:nvSpPr>
-        <p:spPr/>
-        <p:txBody>
-          <a:bodyPr>
-            <a:normAutofit fontScale="92500"/>
-          </a:bodyPr>
-          <a:lstStyle/>
-          <a:p>
-            <a:r>
-              <a:rPr lang="en-US" dirty="0"/>
-              <a:t>One Map-Reduce job isn’t usually enough</a:t>
-            </a:r>
-          </a:p>
-          <a:p>
-            <a:r>
-              <a:rPr lang="en-US" dirty="0"/>
-              <a:t>Google web search index: pipeline of 10 jobs; recommendation systems: 50—100</a:t>
-            </a:r>
-          </a:p>
-          <a:p>
-            <a:r>
-              <a:rPr lang="en-US" dirty="0">
-                <a:solidFill>
-                  <a:srgbClr val="C00000"/>
-                </a:solidFill>
-              </a:rPr>
-              <a:t>Workflows: </a:t>
-            </a:r>
-            <a:r>
-              <a:rPr lang="en-US" dirty="0"/>
-              <a:t>Chains of map-reduce jobs</a:t>
-            </a:r>
-          </a:p>
-          <a:p>
-            <a:pPr lvl="1"/>
-            <a:r>
-              <a:rPr lang="en-US" dirty="0"/>
-              <a:t>E.g., one MR for counting requests by URL; another to sort count</a:t>
-            </a:r>
-          </a:p>
-          <a:p>
-            <a:r>
-              <a:rPr lang="en-US" dirty="0"/>
-              <a:t>Explicit output files from each? </a:t>
-            </a:r>
-          </a:p>
-          <a:p>
-            <a:pPr lvl="1"/>
-            <a:r>
-              <a:rPr lang="en-US" dirty="0"/>
-              <a:t>Like writing to file at the end of each tool in Unix pipeline</a:t>
-            </a:r>
-          </a:p>
-          <a:p>
-            <a:pPr lvl="1"/>
-            <a:r>
-              <a:rPr lang="en-US" dirty="0"/>
-              <a:t>Materialization of the intermediate results needed?</a:t>
-            </a:r>
-          </a:p>
-          <a:p>
-            <a:r>
-              <a:rPr lang="en-US" dirty="0">
-                <a:solidFill>
-                  <a:srgbClr val="C00000"/>
-                </a:solidFill>
-              </a:rPr>
-              <a:t>Stragglers </a:t>
-            </a:r>
-            <a:r>
-              <a:rPr lang="en-US" dirty="0"/>
-              <a:t>make workflows slower</a:t>
-            </a:r>
-          </a:p>
-          <a:p>
-            <a:r>
-              <a:rPr lang="en-US" dirty="0"/>
-              <a:t>Separate systems needed just to orchestrate the workflows correctly</a:t>
-            </a:r>
-          </a:p>
-        </p:txBody>
-      </p:sp>
-    </p:spTree>
-    <p:extLst>
-      <p:ext uri="{BB962C8B-B14F-4D97-AF65-F5344CB8AC3E}">
-        <p14:creationId xmlns:p14="http://schemas.microsoft.com/office/powerpoint/2010/main" val="2880967372"/>
-      </p:ext>
-    </p:extLst>
-  </p:cSld>
-  <p:clrMapOvr>
-    <a:masterClrMapping/>
-  </p:clrMapOvr>
-  <p:timing>
-    <p:tnLst>
-      <p:par>
-        <p:cTn id="1" dur="indefinite" restart="never" nodeType="tmRoot">
-          <p:childTnLst>
-            <p:seq concurrent="1" nextAc="seek">
-              <p:cTn id="2" dur="indefinite" nodeType="mainSeq">
-                <p:childTnLst>
-                  <p:par>
-                    <p:cTn id="3" fill="hold">
-                      <p:stCondLst>
-                        <p:cond delay="indefinite"/>
-                      </p:stCondLst>
-                      <p:childTnLst>
-                        <p:par>
-                          <p:cTn id="4" fill="hold">
-                            <p:stCondLst>
-                              <p:cond delay="0"/>
-                            </p:stCondLst>
-                            <p:childTnLst>
-                              <p:par>
-                                <p:cTn id="5" presetID="1" presetClass="entr" presetSubtype="0" fill="hold" nodeType="clickEffect">
-                                  <p:stCondLst>
-                                    <p:cond delay="0"/>
-                                  </p:stCondLst>
-                                  <p:childTnLst>
-                                    <p:set>
-                                      <p:cBhvr>
-                                        <p:cTn id="6" dur="1" fill="hold">
-                                          <p:stCondLst>
-                                            <p:cond delay="0"/>
-                                          </p:stCondLst>
-                                        </p:cTn>
-                                        <p:tgtEl>
-                                          <p:spTgt spid="3">
-                                            <p:txEl>
-                                              <p:pRg st="0" end="0"/>
-                                            </p:txEl>
-                                          </p:spTgt>
-                                        </p:tgtEl>
-                                        <p:attrNameLst>
-                                          <p:attrName>style.visibility</p:attrName>
-                                        </p:attrNameLst>
-                                      </p:cBhvr>
-                                      <p:to>
-                                        <p:strVal val="visible"/>
-                                      </p:to>
-                                    </p:set>
-                                  </p:childTnLst>
-                                </p:cTn>
-                              </p:par>
-                            </p:childTnLst>
-                          </p:cTn>
-                        </p:par>
-                      </p:childTnLst>
-                    </p:cTn>
-                  </p:par>
-                  <p:par>
-                    <p:cTn id="7" fill="hold">
-                      <p:stCondLst>
-                        <p:cond delay="indefinite"/>
-                      </p:stCondLst>
-                      <p:childTnLst>
-                        <p:par>
-                          <p:cTn id="8" fill="hold">
-                            <p:stCondLst>
-                              <p:cond delay="0"/>
-                            </p:stCondLst>
-                            <p:childTnLst>
-                              <p:par>
-                                <p:cTn id="9" presetID="1" presetClass="entr" presetSubtype="0" fill="hold" nodeType="clickEffect">
-                                  <p:stCondLst>
-                                    <p:cond delay="0"/>
-                                  </p:stCondLst>
-                                  <p:childTnLst>
-                                    <p:set>
-                                      <p:cBhvr>
-                                        <p:cTn id="10" dur="1" fill="hold">
-                                          <p:stCondLst>
-                                            <p:cond delay="0"/>
-                                          </p:stCondLst>
-                                        </p:cTn>
-                                        <p:tgtEl>
-                                          <p:spTgt spid="3">
-                                            <p:txEl>
-                                              <p:pRg st="1" end="1"/>
-                                            </p:txEl>
-                                          </p:spTgt>
-                                        </p:tgtEl>
-                                        <p:attrNameLst>
-                                          <p:attrName>style.visibility</p:attrName>
-                                        </p:attrNameLst>
-                                      </p:cBhvr>
-                                      <p:to>
-                                        <p:strVal val="visible"/>
-                                      </p:to>
-                                    </p:set>
-                                  </p:childTnLst>
-                                </p:cTn>
-                              </p:par>
-                            </p:childTnLst>
-                          </p:cTn>
-                        </p:par>
-                      </p:childTnLst>
-                    </p:cTn>
-                  </p:par>
-                  <p:par>
-                    <p:cTn id="11" fill="hold">
-                      <p:stCondLst>
-                        <p:cond delay="indefinite"/>
-                      </p:stCondLst>
-                      <p:childTnLst>
-                        <p:par>
-                          <p:cTn id="12" fill="hold">
-                            <p:stCondLst>
-                              <p:cond delay="0"/>
-                            </p:stCondLst>
-                            <p:childTnLst>
-                              <p:par>
-                                <p:cTn id="13" presetID="1" presetClass="entr" presetSubtype="0" fill="hold" nodeType="clickEffect">
-                                  <p:stCondLst>
-                                    <p:cond delay="0"/>
-                                  </p:stCondLst>
-                                  <p:childTnLst>
-                                    <p:set>
-                                      <p:cBhvr>
-                                        <p:cTn id="14" dur="1" fill="hold">
-                                          <p:stCondLst>
-                                            <p:cond delay="0"/>
-                                          </p:stCondLst>
-                                        </p:cTn>
-                                        <p:tgtEl>
-                                          <p:spTgt spid="3">
-                                            <p:txEl>
-                                              <p:pRg st="2" end="2"/>
-                                            </p:txEl>
-                                          </p:spTgt>
-                                        </p:tgtEl>
-                                        <p:attrNameLst>
-                                          <p:attrName>style.visibility</p:attrName>
-                                        </p:attrNameLst>
-                                      </p:cBhvr>
-                                      <p:to>
-                                        <p:strVal val="visible"/>
-                                      </p:to>
-                                    </p:set>
-                                  </p:childTnLst>
-                                </p:cTn>
-                              </p:par>
-                            </p:childTnLst>
-                          </p:cTn>
-                        </p:par>
-                      </p:childTnLst>
-                    </p:cTn>
-                  </p:par>
-                  <p:par>
-                    <p:cTn id="15" fill="hold">
-                      <p:stCondLst>
-                        <p:cond delay="indefinite"/>
-                      </p:stCondLst>
-                      <p:childTnLst>
-                        <p:par>
-                          <p:cTn id="16" fill="hold">
-                            <p:stCondLst>
-                              <p:cond delay="0"/>
-                            </p:stCondLst>
-                            <p:childTnLst>
-                              <p:par>
-                                <p:cTn id="17" presetID="1" presetClass="entr" presetSubtype="0" fill="hold" nodeType="clickEffect">
-                                  <p:stCondLst>
-                                    <p:cond delay="0"/>
-                                  </p:stCondLst>
-                                  <p:childTnLst>
-                                    <p:set>
-                                      <p:cBhvr>
-                                        <p:cTn id="18" dur="1" fill="hold">
-                                          <p:stCondLst>
-                                            <p:cond delay="0"/>
-                                          </p:stCondLst>
-                                        </p:cTn>
-                                        <p:tgtEl>
-                                          <p:spTgt spid="3">
-                                            <p:txEl>
-                                              <p:pRg st="3" end="3"/>
-                                            </p:txEl>
-                                          </p:spTgt>
-                                        </p:tgtEl>
-                                        <p:attrNameLst>
-                                          <p:attrName>style.visibility</p:attrName>
-                                        </p:attrNameLst>
-                                      </p:cBhvr>
-                                      <p:to>
-                                        <p:strVal val="visible"/>
-                                      </p:to>
-                                    </p:set>
-                                  </p:childTnLst>
-                                </p:cTn>
-                              </p:par>
-                            </p:childTnLst>
-                          </p:cTn>
-                        </p:par>
-                      </p:childTnLst>
-                    </p:cTn>
-                  </p:par>
-                  <p:par>
-                    <p:cTn id="19" fill="hold">
-                      <p:stCondLst>
-                        <p:cond delay="indefinite"/>
-                      </p:stCondLst>
-                      <p:childTnLst>
-                        <p:par>
-                          <p:cTn id="20" fill="hold">
-                            <p:stCondLst>
-                              <p:cond delay="0"/>
-                            </p:stCondLst>
-                            <p:childTnLst>
-                              <p:par>
-                                <p:cTn id="21" presetID="1" presetClass="entr" presetSubtype="0" fill="hold" nodeType="clickEffect">
-                                  <p:stCondLst>
-                                    <p:cond delay="0"/>
-                                  </p:stCondLst>
-                                  <p:childTnLst>
-                                    <p:set>
-                                      <p:cBhvr>
-                                        <p:cTn id="22" dur="1" fill="hold">
-                                          <p:stCondLst>
-                                            <p:cond delay="0"/>
-                                          </p:stCondLst>
-                                        </p:cTn>
-                                        <p:tgtEl>
-                                          <p:spTgt spid="3">
-                                            <p:txEl>
-                                              <p:pRg st="4" end="4"/>
-                                            </p:txEl>
-                                          </p:spTgt>
-                                        </p:tgtEl>
-                                        <p:attrNameLst>
-                                          <p:attrName>style.visibility</p:attrName>
-                                        </p:attrNameLst>
-                                      </p:cBhvr>
-                                      <p:to>
-                                        <p:strVal val="visible"/>
-                                      </p:to>
-                                    </p:set>
-                                  </p:childTnLst>
-                                </p:cTn>
-                              </p:par>
-                            </p:childTnLst>
-                          </p:cTn>
-                        </p:par>
-                      </p:childTnLst>
-                    </p:cTn>
-                  </p:par>
-                  <p:par>
-                    <p:cTn id="23" fill="hold">
-                      <p:stCondLst>
-                        <p:cond delay="indefinite"/>
-                      </p:stCondLst>
-                      <p:childTnLst>
-                        <p:par>
-                          <p:cTn id="24" fill="hold">
-                            <p:stCondLst>
-                              <p:cond delay="0"/>
-                            </p:stCondLst>
-                            <p:childTnLst>
-                              <p:par>
-                                <p:cTn id="25" presetID="1" presetClass="entr" presetSubtype="0" fill="hold" nodeType="clickEffect">
-                                  <p:stCondLst>
-                                    <p:cond delay="0"/>
-                                  </p:stCondLst>
-                                  <p:childTnLst>
-                                    <p:set>
-                                      <p:cBhvr>
-                                        <p:cTn id="26" dur="1" fill="hold">
-                                          <p:stCondLst>
-                                            <p:cond delay="0"/>
-                                          </p:stCondLst>
-                                        </p:cTn>
-                                        <p:tgtEl>
-                                          <p:spTgt spid="3">
-                                            <p:txEl>
-                                              <p:pRg st="5" end="5"/>
-                                            </p:txEl>
-                                          </p:spTgt>
-                                        </p:tgtEl>
-                                        <p:attrNameLst>
-                                          <p:attrName>style.visibility</p:attrName>
-                                        </p:attrNameLst>
-                                      </p:cBhvr>
-                                      <p:to>
-                                        <p:strVal val="visible"/>
-                                      </p:to>
-                                    </p:set>
-                                  </p:childTnLst>
-                                </p:cTn>
-                              </p:par>
-                            </p:childTnLst>
-                          </p:cTn>
-                        </p:par>
-                      </p:childTnLst>
-                    </p:cTn>
-                  </p:par>
-                  <p:par>
-                    <p:cTn id="27" fill="hold">
-                      <p:stCondLst>
-                        <p:cond delay="indefinite"/>
-                      </p:stCondLst>
-                      <p:childTnLst>
-                        <p:par>
-                          <p:cTn id="28" fill="hold">
-                            <p:stCondLst>
-                              <p:cond delay="0"/>
-                            </p:stCondLst>
-                            <p:childTnLst>
-                              <p:par>
-                                <p:cTn id="29" presetID="1" presetClass="entr" presetSubtype="0" fill="hold" nodeType="clickEffect">
-                                  <p:stCondLst>
-                                    <p:cond delay="0"/>
-                                  </p:stCondLst>
-                                  <p:childTnLst>
-                                    <p:set>
-                                      <p:cBhvr>
-                                        <p:cTn id="30" dur="1" fill="hold">
-                                          <p:stCondLst>
-                                            <p:cond delay="0"/>
-                                          </p:stCondLst>
-                                        </p:cTn>
-                                        <p:tgtEl>
-                                          <p:spTgt spid="3">
-                                            <p:txEl>
-                                              <p:pRg st="6" end="6"/>
-                                            </p:txEl>
-                                          </p:spTgt>
-                                        </p:tgtEl>
-                                        <p:attrNameLst>
-                                          <p:attrName>style.visibility</p:attrName>
-                                        </p:attrNameLst>
-                                      </p:cBhvr>
-                                      <p:to>
-                                        <p:strVal val="visible"/>
-                                      </p:to>
-                                    </p:set>
-                                  </p:childTnLst>
-                                </p:cTn>
-                              </p:par>
-                            </p:childTnLst>
-                          </p:cTn>
-                        </p:par>
-                      </p:childTnLst>
-                    </p:cTn>
-                  </p:par>
-                  <p:par>
-                    <p:cTn id="31" fill="hold">
-                      <p:stCondLst>
-                        <p:cond delay="indefinite"/>
-                      </p:stCondLst>
-                      <p:childTnLst>
-                        <p:par>
-                          <p:cTn id="32" fill="hold">
-                            <p:stCondLst>
-                              <p:cond delay="0"/>
-                            </p:stCondLst>
-                            <p:childTnLst>
-                              <p:par>
-                                <p:cTn id="33" presetID="1" presetClass="entr" presetSubtype="0" fill="hold" nodeType="clickEffect">
-                                  <p:stCondLst>
-                                    <p:cond delay="0"/>
-                                  </p:stCondLst>
-                                  <p:childTnLst>
-                                    <p:set>
-                                      <p:cBhvr>
-                                        <p:cTn id="34" dur="1" fill="hold">
-                                          <p:stCondLst>
-                                            <p:cond delay="0"/>
-                                          </p:stCondLst>
-                                        </p:cTn>
-                                        <p:tgtEl>
-                                          <p:spTgt spid="3">
-                                            <p:txEl>
-                                              <p:pRg st="7" end="7"/>
-                                            </p:txEl>
-                                          </p:spTgt>
-                                        </p:tgtEl>
-                                        <p:attrNameLst>
-                                          <p:attrName>style.visibility</p:attrName>
-                                        </p:attrNameLst>
-                                      </p:cBhvr>
-                                      <p:to>
-                                        <p:strVal val="visible"/>
-                                      </p:to>
-                                    </p:set>
-                                  </p:childTnLst>
-                                </p:cTn>
-                              </p:par>
-                            </p:childTnLst>
-                          </p:cTn>
-                        </p:par>
-                      </p:childTnLst>
-                    </p:cTn>
-                  </p:par>
-                  <p:par>
-                    <p:cTn id="35" fill="hold">
-                      <p:stCondLst>
-                        <p:cond delay="indefinite"/>
-                      </p:stCondLst>
-                      <p:childTnLst>
-                        <p:par>
-                          <p:cTn id="36" fill="hold">
-                            <p:stCondLst>
-                              <p:cond delay="0"/>
-                            </p:stCondLst>
-                            <p:childTnLst>
-                              <p:par>
-                                <p:cTn id="37" presetID="1" presetClass="entr" presetSubtype="0" fill="hold" nodeType="clickEffect">
-                                  <p:stCondLst>
-                                    <p:cond delay="0"/>
-                                  </p:stCondLst>
-                                  <p:childTnLst>
-                                    <p:set>
-                                      <p:cBhvr>
-                                        <p:cTn id="38" dur="1" fill="hold">
-                                          <p:stCondLst>
-                                            <p:cond delay="0"/>
-                                          </p:stCondLst>
-                                        </p:cTn>
-                                        <p:tgtEl>
-                                          <p:spTgt spid="3">
-                                            <p:txEl>
-                                              <p:pRg st="8" end="8"/>
-                                            </p:txEl>
-                                          </p:spTgt>
-                                        </p:tgtEl>
-                                        <p:attrNameLst>
-                                          <p:attrName>style.visibility</p:attrName>
-                                        </p:attrNameLst>
-                                      </p:cBhvr>
-                                      <p:to>
-                                        <p:strVal val="visible"/>
-                                      </p:to>
-                                    </p:set>
-                                  </p:childTnLst>
-                                </p:cTn>
-                              </p:par>
-                            </p:childTnLst>
-                          </p:cTn>
-                        </p:par>
-                      </p:childTnLst>
-                    </p:cTn>
-                  </p:par>
-                </p:childTnLst>
-              </p:cTn>
-              <p:prevCondLst>
-                <p:cond evt="onPrev" delay="0">
-                  <p:tgtEl>
-                    <p:sldTgt/>
-                  </p:tgtEl>
-                </p:cond>
-              </p:prevCondLst>
-              <p:nextCondLst>
-                <p:cond evt="onNext" delay="0">
-                  <p:tgtEl>
-                    <p:sldTgt/>
-                  </p:tgtEl>
-                </p:cond>
-              </p:nextCondLst>
-            </p:seq>
-          </p:childTnLst>
-        </p:cTn>
-      </p:par>
-    </p:tnLst>
-  </p:timing>
-</p:sld>
-</file>
-
-<file path=ppt/slides/slide22.xml><?xml version="1.0" encoding="utf-8"?>
-<p:sld xmlns:a="http://schemas.openxmlformats.org/drawingml/2006/main" xmlns:r="http://schemas.openxmlformats.org/officeDocument/2006/relationships" xmlns:p="http://schemas.openxmlformats.org/presentationml/2006/main">
-  <p:cSld>
-    <p:spTree>
-      <p:nvGrpSpPr>
-        <p:cNvPr id="1" name=""/>
-        <p:cNvGrpSpPr/>
-        <p:nvPr/>
-      </p:nvGrpSpPr>
-      <p:grpSpPr>
-        <a:xfrm>
-          <a:off x="0" y="0"/>
-          <a:ext cx="0" cy="0"/>
-          <a:chOff x="0" y="0"/>
-          <a:chExt cx="0" cy="0"/>
-        </a:xfrm>
-      </p:grpSpPr>
-      <p:sp>
-        <p:nvSpPr>
-          <p:cNvPr id="2" name="Title 1">
-            <a:extLst>
-              <a:ext uri="{FF2B5EF4-FFF2-40B4-BE49-F238E27FC236}">
-                <a16:creationId xmlns:a16="http://schemas.microsoft.com/office/drawing/2014/main" id="{BD84D17E-D117-5C78-D3CF-0A7ED4C3F995}"/>
-              </a:ext>
-            </a:extLst>
-          </p:cNvPr>
-          <p:cNvSpPr>
-            <a:spLocks noGrp="1"/>
-          </p:cNvSpPr>
-          <p:nvPr>
-            <p:ph type="title"/>
-          </p:nvPr>
-        </p:nvSpPr>
-        <p:spPr/>
-        <p:txBody>
-          <a:bodyPr/>
-          <a:lstStyle/>
-          <a:p>
-            <a:r>
-              <a:rPr lang="en-US" dirty="0"/>
-              <a:t>Building on Map-Reduce: (2) Dataflow</a:t>
-            </a:r>
-          </a:p>
-        </p:txBody>
-      </p:sp>
-      <p:sp>
-        <p:nvSpPr>
-          <p:cNvPr id="3" name="Content Placeholder 2">
-            <a:extLst>
-              <a:ext uri="{FF2B5EF4-FFF2-40B4-BE49-F238E27FC236}">
-                <a16:creationId xmlns:a16="http://schemas.microsoft.com/office/drawing/2014/main" id="{6A30B7F3-CC27-E6D2-D7B8-90380BB6CE31}"/>
-              </a:ext>
-            </a:extLst>
-          </p:cNvPr>
-          <p:cNvSpPr>
-            <a:spLocks noGrp="1"/>
-          </p:cNvSpPr>
-          <p:nvPr>
-            <p:ph idx="1"/>
-          </p:nvPr>
-        </p:nvSpPr>
-        <p:spPr/>
-        <p:txBody>
-          <a:bodyPr>
-            <a:normAutofit fontScale="92500" lnSpcReduction="10000"/>
-          </a:bodyPr>
-          <a:lstStyle/>
-          <a:p>
-            <a:r>
-              <a:rPr lang="en-US" dirty="0">
-                <a:solidFill>
-                  <a:srgbClr val="C00000"/>
-                </a:solidFill>
-              </a:rPr>
-              <a:t>Dataflow engines: </a:t>
-            </a:r>
-            <a:r>
-              <a:rPr lang="en-US" dirty="0"/>
-              <a:t>handle the entire workflow</a:t>
-            </a:r>
-          </a:p>
-          <a:p>
-            <a:pPr lvl="1"/>
-            <a:r>
-              <a:rPr lang="en-US" dirty="0"/>
-              <a:t>“Operators”: chain map-reduce functions</a:t>
-            </a:r>
-          </a:p>
-          <a:p>
-            <a:pPr lvl="1"/>
-            <a:r>
-              <a:rPr lang="en-US" dirty="0"/>
-              <a:t>Only persist intermediate outputs to DFS when necessary</a:t>
-            </a:r>
-          </a:p>
-          <a:p>
-            <a:pPr lvl="1"/>
-            <a:r>
-              <a:rPr lang="en-US" dirty="0"/>
-              <a:t>Chain reducers (no explicit mappers) when the key is the same</a:t>
-            </a:r>
-          </a:p>
-          <a:p>
-            <a:pPr lvl="1"/>
-            <a:r>
-              <a:rPr lang="en-US" dirty="0"/>
-              <a:t>Don’t wait for stragglers of the previous job</a:t>
-            </a:r>
-          </a:p>
-          <a:p>
-            <a:endParaRPr lang="en-US" dirty="0"/>
-          </a:p>
-          <a:p>
-            <a:r>
-              <a:rPr lang="en-US" dirty="0"/>
-              <a:t>Stream Processing</a:t>
-            </a:r>
-          </a:p>
-          <a:p>
-            <a:pPr lvl="1"/>
-            <a:r>
-              <a:rPr lang="en-US" dirty="0"/>
-              <a:t>Incremental execution of batch jobs when new data arrives</a:t>
-            </a:r>
-          </a:p>
-          <a:p>
-            <a:pPr lvl="1"/>
-            <a:endParaRPr lang="en-US" dirty="0"/>
-          </a:p>
-          <a:p>
-            <a:r>
-              <a:rPr lang="en-US" dirty="0"/>
-              <a:t>Selectively materialize or recompute intermediate results</a:t>
-            </a:r>
-          </a:p>
-          <a:p>
-            <a:pPr lvl="1"/>
-            <a:r>
-              <a:rPr lang="en-US" dirty="0"/>
-              <a:t>Lineages (RDD/Spark) or checkpoint</a:t>
-            </a:r>
-          </a:p>
-        </p:txBody>
-      </p:sp>
-    </p:spTree>
-    <p:extLst>
-      <p:ext uri="{BB962C8B-B14F-4D97-AF65-F5344CB8AC3E}">
-        <p14:creationId xmlns:p14="http://schemas.microsoft.com/office/powerpoint/2010/main" val="3946976576"/>
-      </p:ext>
-    </p:extLst>
-  </p:cSld>
-  <p:clrMapOvr>
-    <a:masterClrMapping/>
-  </p:clrMapOvr>
-  <p:timing>
-    <p:tnLst>
-      <p:par>
-        <p:cTn id="1" dur="indefinite" restart="never" nodeType="tmRoot">
-          <p:childTnLst>
-            <p:seq concurrent="1" nextAc="seek">
-              <p:cTn id="2" dur="indefinite" nodeType="mainSeq">
-                <p:childTnLst>
-                  <p:par>
-                    <p:cTn id="3" fill="hold">
-                      <p:stCondLst>
-                        <p:cond delay="indefinite"/>
-                      </p:stCondLst>
-                      <p:childTnLst>
-                        <p:par>
-                          <p:cTn id="4" fill="hold">
-                            <p:stCondLst>
-                              <p:cond delay="0"/>
-                            </p:stCondLst>
-                            <p:childTnLst>
-                              <p:par>
-                                <p:cTn id="5" presetID="1" presetClass="entr" presetSubtype="0" fill="hold" nodeType="clickEffect">
-                                  <p:stCondLst>
-                                    <p:cond delay="0"/>
-                                  </p:stCondLst>
-                                  <p:childTnLst>
-                                    <p:set>
-                                      <p:cBhvr>
-                                        <p:cTn id="6" dur="1" fill="hold">
-                                          <p:stCondLst>
-                                            <p:cond delay="0"/>
-                                          </p:stCondLst>
-                                        </p:cTn>
-                                        <p:tgtEl>
-                                          <p:spTgt spid="3">
-                                            <p:txEl>
-                                              <p:pRg st="0" end="0"/>
-                                            </p:txEl>
-                                          </p:spTgt>
-                                        </p:tgtEl>
-                                        <p:attrNameLst>
-                                          <p:attrName>style.visibility</p:attrName>
-                                        </p:attrNameLst>
-                                      </p:cBhvr>
-                                      <p:to>
-                                        <p:strVal val="visible"/>
-                                      </p:to>
-                                    </p:set>
-                                  </p:childTnLst>
-                                </p:cTn>
-                              </p:par>
-                            </p:childTnLst>
-                          </p:cTn>
-                        </p:par>
-                      </p:childTnLst>
-                    </p:cTn>
-                  </p:par>
-                  <p:par>
-                    <p:cTn id="7" fill="hold">
-                      <p:stCondLst>
-                        <p:cond delay="indefinite"/>
-                      </p:stCondLst>
-                      <p:childTnLst>
-                        <p:par>
-                          <p:cTn id="8" fill="hold">
-                            <p:stCondLst>
-                              <p:cond delay="0"/>
-                            </p:stCondLst>
-                            <p:childTnLst>
-                              <p:par>
-                                <p:cTn id="9" presetID="1" presetClass="entr" presetSubtype="0" fill="hold" nodeType="clickEffect">
-                                  <p:stCondLst>
-                                    <p:cond delay="0"/>
-                                  </p:stCondLst>
-                                  <p:childTnLst>
-                                    <p:set>
-                                      <p:cBhvr>
-                                        <p:cTn id="10" dur="1" fill="hold">
-                                          <p:stCondLst>
-                                            <p:cond delay="0"/>
-                                          </p:stCondLst>
-                                        </p:cTn>
-                                        <p:tgtEl>
-                                          <p:spTgt spid="3">
-                                            <p:txEl>
-                                              <p:pRg st="1" end="1"/>
-                                            </p:txEl>
-                                          </p:spTgt>
-                                        </p:tgtEl>
-                                        <p:attrNameLst>
-                                          <p:attrName>style.visibility</p:attrName>
-                                        </p:attrNameLst>
-                                      </p:cBhvr>
-                                      <p:to>
-                                        <p:strVal val="visible"/>
-                                      </p:to>
-                                    </p:set>
-                                  </p:childTnLst>
-                                </p:cTn>
-                              </p:par>
-                            </p:childTnLst>
-                          </p:cTn>
-                        </p:par>
-                      </p:childTnLst>
-                    </p:cTn>
-                  </p:par>
-                  <p:par>
-                    <p:cTn id="11" fill="hold">
-                      <p:stCondLst>
-                        <p:cond delay="indefinite"/>
-                      </p:stCondLst>
-                      <p:childTnLst>
-                        <p:par>
-                          <p:cTn id="12" fill="hold">
-                            <p:stCondLst>
-                              <p:cond delay="0"/>
-                            </p:stCondLst>
-                            <p:childTnLst>
-                              <p:par>
-                                <p:cTn id="13" presetID="1" presetClass="entr" presetSubtype="0" fill="hold" nodeType="clickEffect">
-                                  <p:stCondLst>
-                                    <p:cond delay="0"/>
-                                  </p:stCondLst>
-                                  <p:childTnLst>
-                                    <p:set>
-                                      <p:cBhvr>
-                                        <p:cTn id="14" dur="1" fill="hold">
-                                          <p:stCondLst>
-                                            <p:cond delay="0"/>
-                                          </p:stCondLst>
-                                        </p:cTn>
-                                        <p:tgtEl>
-                                          <p:spTgt spid="3">
-                                            <p:txEl>
-                                              <p:pRg st="2" end="2"/>
-                                            </p:txEl>
-                                          </p:spTgt>
-                                        </p:tgtEl>
-                                        <p:attrNameLst>
-                                          <p:attrName>style.visibility</p:attrName>
-                                        </p:attrNameLst>
-                                      </p:cBhvr>
-                                      <p:to>
-                                        <p:strVal val="visible"/>
-                                      </p:to>
-                                    </p:set>
-                                  </p:childTnLst>
-                                </p:cTn>
-                              </p:par>
-                            </p:childTnLst>
-                          </p:cTn>
-                        </p:par>
-                      </p:childTnLst>
-                    </p:cTn>
-                  </p:par>
-                  <p:par>
-                    <p:cTn id="15" fill="hold">
-                      <p:stCondLst>
-                        <p:cond delay="indefinite"/>
-                      </p:stCondLst>
-                      <p:childTnLst>
-                        <p:par>
-                          <p:cTn id="16" fill="hold">
-                            <p:stCondLst>
-                              <p:cond delay="0"/>
-                            </p:stCondLst>
-                            <p:childTnLst>
-                              <p:par>
-                                <p:cTn id="17" presetID="1" presetClass="entr" presetSubtype="0" fill="hold" nodeType="clickEffect">
-                                  <p:stCondLst>
-                                    <p:cond delay="0"/>
-                                  </p:stCondLst>
-                                  <p:childTnLst>
-                                    <p:set>
-                                      <p:cBhvr>
-                                        <p:cTn id="18" dur="1" fill="hold">
-                                          <p:stCondLst>
-                                            <p:cond delay="0"/>
-                                          </p:stCondLst>
-                                        </p:cTn>
-                                        <p:tgtEl>
-                                          <p:spTgt spid="3">
-                                            <p:txEl>
-                                              <p:pRg st="3" end="3"/>
-                                            </p:txEl>
-                                          </p:spTgt>
-                                        </p:tgtEl>
-                                        <p:attrNameLst>
-                                          <p:attrName>style.visibility</p:attrName>
-                                        </p:attrNameLst>
-                                      </p:cBhvr>
-                                      <p:to>
-                                        <p:strVal val="visible"/>
-                                      </p:to>
-                                    </p:set>
-                                  </p:childTnLst>
-                                </p:cTn>
-                              </p:par>
-                            </p:childTnLst>
-                          </p:cTn>
-                        </p:par>
-                      </p:childTnLst>
-                    </p:cTn>
-                  </p:par>
-                  <p:par>
-                    <p:cTn id="19" fill="hold">
-                      <p:stCondLst>
-                        <p:cond delay="indefinite"/>
-                      </p:stCondLst>
-                      <p:childTnLst>
-                        <p:par>
-                          <p:cTn id="20" fill="hold">
-                            <p:stCondLst>
-                              <p:cond delay="0"/>
-                            </p:stCondLst>
-                            <p:childTnLst>
-                              <p:par>
-                                <p:cTn id="21" presetID="1" presetClass="entr" presetSubtype="0" fill="hold" nodeType="clickEffect">
-                                  <p:stCondLst>
-                                    <p:cond delay="0"/>
-                                  </p:stCondLst>
-                                  <p:childTnLst>
-                                    <p:set>
-                                      <p:cBhvr>
-                                        <p:cTn id="22" dur="1" fill="hold">
-                                          <p:stCondLst>
-                                            <p:cond delay="0"/>
-                                          </p:stCondLst>
-                                        </p:cTn>
-                                        <p:tgtEl>
-                                          <p:spTgt spid="3">
-                                            <p:txEl>
-                                              <p:pRg st="4" end="4"/>
-                                            </p:txEl>
-                                          </p:spTgt>
-                                        </p:tgtEl>
-                                        <p:attrNameLst>
-                                          <p:attrName>style.visibility</p:attrName>
-                                        </p:attrNameLst>
-                                      </p:cBhvr>
-                                      <p:to>
-                                        <p:strVal val="visible"/>
-                                      </p:to>
-                                    </p:set>
-                                  </p:childTnLst>
-                                </p:cTn>
-                              </p:par>
-                            </p:childTnLst>
-                          </p:cTn>
-                        </p:par>
-                      </p:childTnLst>
-                    </p:cTn>
-                  </p:par>
-                  <p:par>
-                    <p:cTn id="23" fill="hold">
-                      <p:stCondLst>
-                        <p:cond delay="indefinite"/>
-                      </p:stCondLst>
-                      <p:childTnLst>
-                        <p:par>
-                          <p:cTn id="24" fill="hold">
-                            <p:stCondLst>
-                              <p:cond delay="0"/>
-                            </p:stCondLst>
-                            <p:childTnLst>
-                              <p:par>
-                                <p:cTn id="25" presetID="1" presetClass="entr" presetSubtype="0" fill="hold" nodeType="clickEffect">
-                                  <p:stCondLst>
-                                    <p:cond delay="0"/>
-                                  </p:stCondLst>
-                                  <p:childTnLst>
-                                    <p:set>
-                                      <p:cBhvr>
-                                        <p:cTn id="26" dur="1" fill="hold">
-                                          <p:stCondLst>
-                                            <p:cond delay="0"/>
-                                          </p:stCondLst>
-                                        </p:cTn>
-                                        <p:tgtEl>
-                                          <p:spTgt spid="3">
-                                            <p:txEl>
-                                              <p:pRg st="6" end="6"/>
-                                            </p:txEl>
-                                          </p:spTgt>
-                                        </p:tgtEl>
-                                        <p:attrNameLst>
-                                          <p:attrName>style.visibility</p:attrName>
-                                        </p:attrNameLst>
-                                      </p:cBhvr>
-                                      <p:to>
-                                        <p:strVal val="visible"/>
-                                      </p:to>
-                                    </p:set>
-                                  </p:childTnLst>
-                                </p:cTn>
-                              </p:par>
-                            </p:childTnLst>
-                          </p:cTn>
-                        </p:par>
-                      </p:childTnLst>
-                    </p:cTn>
-                  </p:par>
-                  <p:par>
-                    <p:cTn id="27" fill="hold">
-                      <p:stCondLst>
-                        <p:cond delay="indefinite"/>
-                      </p:stCondLst>
-                      <p:childTnLst>
-                        <p:par>
-                          <p:cTn id="28" fill="hold">
-                            <p:stCondLst>
-                              <p:cond delay="0"/>
-                            </p:stCondLst>
-                            <p:childTnLst>
-                              <p:par>
-                                <p:cTn id="29" presetID="1" presetClass="entr" presetSubtype="0" fill="hold" nodeType="clickEffect">
-                                  <p:stCondLst>
-                                    <p:cond delay="0"/>
-                                  </p:stCondLst>
-                                  <p:childTnLst>
-                                    <p:set>
-                                      <p:cBhvr>
-                                        <p:cTn id="30" dur="1" fill="hold">
-                                          <p:stCondLst>
-                                            <p:cond delay="0"/>
-                                          </p:stCondLst>
-                                        </p:cTn>
-                                        <p:tgtEl>
-                                          <p:spTgt spid="3">
-                                            <p:txEl>
-                                              <p:pRg st="7" end="7"/>
-                                            </p:txEl>
-                                          </p:spTgt>
-                                        </p:tgtEl>
-                                        <p:attrNameLst>
-                                          <p:attrName>style.visibility</p:attrName>
-                                        </p:attrNameLst>
-                                      </p:cBhvr>
-                                      <p:to>
-                                        <p:strVal val="visible"/>
-                                      </p:to>
-                                    </p:set>
-                                  </p:childTnLst>
-                                </p:cTn>
-                              </p:par>
-                            </p:childTnLst>
-                          </p:cTn>
-                        </p:par>
-                      </p:childTnLst>
-                    </p:cTn>
-                  </p:par>
-                  <p:par>
-                    <p:cTn id="31" fill="hold">
-                      <p:stCondLst>
-                        <p:cond delay="indefinite"/>
-                      </p:stCondLst>
-                      <p:childTnLst>
-                        <p:par>
-                          <p:cTn id="32" fill="hold">
-                            <p:stCondLst>
-                              <p:cond delay="0"/>
-                            </p:stCondLst>
-                            <p:childTnLst>
-                              <p:par>
-                                <p:cTn id="33" presetID="1" presetClass="entr" presetSubtype="0" fill="hold" nodeType="clickEffect">
-                                  <p:stCondLst>
-                                    <p:cond delay="0"/>
-                                  </p:stCondLst>
-                                  <p:childTnLst>
-                                    <p:set>
-                                      <p:cBhvr>
-                                        <p:cTn id="34" dur="1" fill="hold">
-                                          <p:stCondLst>
-                                            <p:cond delay="0"/>
-                                          </p:stCondLst>
-                                        </p:cTn>
-                                        <p:tgtEl>
-                                          <p:spTgt spid="3">
-                                            <p:txEl>
-                                              <p:pRg st="9" end="9"/>
-                                            </p:txEl>
-                                          </p:spTgt>
-                                        </p:tgtEl>
-                                        <p:attrNameLst>
-                                          <p:attrName>style.visibility</p:attrName>
-                                        </p:attrNameLst>
-                                      </p:cBhvr>
-                                      <p:to>
-                                        <p:strVal val="visible"/>
-                                      </p:to>
-                                    </p:set>
-                                  </p:childTnLst>
-                                </p:cTn>
-                              </p:par>
-                            </p:childTnLst>
-                          </p:cTn>
-                        </p:par>
-                      </p:childTnLst>
-                    </p:cTn>
-                  </p:par>
-                  <p:par>
-                    <p:cTn id="35" fill="hold">
-                      <p:stCondLst>
-                        <p:cond delay="indefinite"/>
-                      </p:stCondLst>
-                      <p:childTnLst>
-                        <p:par>
-                          <p:cTn id="36" fill="hold">
-                            <p:stCondLst>
-                              <p:cond delay="0"/>
-                            </p:stCondLst>
-                            <p:childTnLst>
-                              <p:par>
-                                <p:cTn id="37" presetID="1" presetClass="entr" presetSubtype="0" fill="hold" nodeType="clickEffect">
-                                  <p:stCondLst>
-                                    <p:cond delay="0"/>
-                                  </p:stCondLst>
-                                  <p:childTnLst>
-                                    <p:set>
-                                      <p:cBhvr>
-                                        <p:cTn id="38" dur="1" fill="hold">
-                                          <p:stCondLst>
-                                            <p:cond delay="0"/>
-                                          </p:stCondLst>
-                                        </p:cTn>
-                                        <p:tgtEl>
-                                          <p:spTgt spid="3">
-                                            <p:txEl>
-                                              <p:pRg st="10" end="10"/>
-                                            </p:txEl>
-                                          </p:spTgt>
-                                        </p:tgtEl>
-                                        <p:attrNameLst>
-                                          <p:attrName>style.visibility</p:attrName>
-                                        </p:attrNameLst>
-                                      </p:cBhvr>
-                                      <p:to>
-                                        <p:strVal val="visible"/>
-                                      </p:to>
-                                    </p:set>
-                                  </p:childTnLst>
-                                </p:cTn>
-                              </p:par>
-                            </p:childTnLst>
-                          </p:cTn>
-                        </p:par>
-                      </p:childTnLst>
-                    </p:cTn>
-                  </p:par>
-                </p:childTnLst>
-              </p:cTn>
-              <p:prevCondLst>
-                <p:cond evt="onPrev" delay="0">
-                  <p:tgtEl>
-                    <p:sldTgt/>
-                  </p:tgtEl>
-                </p:cond>
-              </p:prevCondLst>
-              <p:nextCondLst>
-                <p:cond evt="onNext" delay="0">
-                  <p:tgtEl>
-                    <p:sldTgt/>
-                  </p:tgtEl>
-                </p:cond>
-              </p:nextCondLst>
-            </p:seq>
-          </p:childTnLst>
-        </p:cTn>
-      </p:par>
-    </p:tnLst>
   </p:timing>
 </p:sld>
 </file>
@@ -22754,7 +19346,7 @@
           <a:effectLst/>
           <a:extLst>
             <a:ext uri="{909E8E84-426E-40dd-AFC4-6F175D3DCCD1}">
-              <a14:hiddenFill xmlns:a14="http://schemas.microsoft.com/office/drawing/2010/main" xmlns="">
+              <a14:hiddenFill xmlns="" xmlns:a14="http://schemas.microsoft.com/office/drawing/2010/main">
                 <a:blipFill dpi="0" rotWithShape="0">
                   <a:blip/>
                   <a:srcRect/>
@@ -22765,7 +19357,7 @@
               </a14:hiddenFill>
             </a:ext>
             <a:ext uri="{91240B29-F687-4f45-9708-019B960494DF}">
-              <a14:hiddenLine xmlns:a14="http://schemas.microsoft.com/office/drawing/2010/main" xmlns="" w="9525">
+              <a14:hiddenLine xmlns="" xmlns:a14="http://schemas.microsoft.com/office/drawing/2010/main" w="9525">
                 <a:solidFill>
                   <a:srgbClr val="000000"/>
                 </a:solidFill>
@@ -22775,7 +19367,7 @@
               </a14:hiddenLine>
             </a:ext>
             <a:ext uri="{AF507438-7753-43e0-B8FC-AC1667EBCBE1}">
-              <a14:hiddenEffects xmlns:a14="http://schemas.microsoft.com/office/drawing/2010/main" xmlns="">
+              <a14:hiddenEffects xmlns="" xmlns:a14="http://schemas.microsoft.com/office/drawing/2010/main">
                 <a:effectLst>
                   <a:outerShdw blurRad="63500" dist="38099" dir="2700000" algn="ctr" rotWithShape="0">
                     <a:srgbClr val="000000">
@@ -22860,7 +19452,7 @@
           <a:effectLst/>
           <a:extLst>
             <a:ext uri="{909E8E84-426E-40dd-AFC4-6F175D3DCCD1}">
-              <a14:hiddenFill xmlns:a14="http://schemas.microsoft.com/office/drawing/2010/main" xmlns="">
+              <a14:hiddenFill xmlns="" xmlns:a14="http://schemas.microsoft.com/office/drawing/2010/main">
                 <a:blipFill dpi="0" rotWithShape="0">
                   <a:blip/>
                   <a:srcRect/>
@@ -22871,7 +19463,7 @@
               </a14:hiddenFill>
             </a:ext>
             <a:ext uri="{91240B29-F687-4f45-9708-019B960494DF}">
-              <a14:hiddenLine xmlns:a14="http://schemas.microsoft.com/office/drawing/2010/main" xmlns="" w="9525">
+              <a14:hiddenLine xmlns="" xmlns:a14="http://schemas.microsoft.com/office/drawing/2010/main" w="9525">
                 <a:solidFill>
                   <a:srgbClr val="000000"/>
                 </a:solidFill>
@@ -22881,7 +19473,7 @@
               </a14:hiddenLine>
             </a:ext>
             <a:ext uri="{AF507438-7753-43e0-B8FC-AC1667EBCBE1}">
-              <a14:hiddenEffects xmlns:a14="http://schemas.microsoft.com/office/drawing/2010/main" xmlns="">
+              <a14:hiddenEffects xmlns="" xmlns:a14="http://schemas.microsoft.com/office/drawing/2010/main">
                 <a:effectLst>
                   <a:outerShdw blurRad="63500" dist="38099" dir="2700000" algn="ctr" rotWithShape="0">
                     <a:srgbClr val="000000">
@@ -22966,7 +19558,7 @@
           <a:effectLst/>
           <a:extLst>
             <a:ext uri="{909E8E84-426E-40dd-AFC4-6F175D3DCCD1}">
-              <a14:hiddenFill xmlns:a14="http://schemas.microsoft.com/office/drawing/2010/main" xmlns="">
+              <a14:hiddenFill xmlns="" xmlns:a14="http://schemas.microsoft.com/office/drawing/2010/main">
                 <a:blipFill dpi="0" rotWithShape="0">
                   <a:blip/>
                   <a:srcRect/>
@@ -22977,7 +19569,7 @@
               </a14:hiddenFill>
             </a:ext>
             <a:ext uri="{91240B29-F687-4f45-9708-019B960494DF}">
-              <a14:hiddenLine xmlns:a14="http://schemas.microsoft.com/office/drawing/2010/main" xmlns="" w="9525">
+              <a14:hiddenLine xmlns="" xmlns:a14="http://schemas.microsoft.com/office/drawing/2010/main" w="9525">
                 <a:solidFill>
                   <a:srgbClr val="000000"/>
                 </a:solidFill>
@@ -22987,7 +19579,7 @@
               </a14:hiddenLine>
             </a:ext>
             <a:ext uri="{AF507438-7753-43e0-B8FC-AC1667EBCBE1}">
-              <a14:hiddenEffects xmlns:a14="http://schemas.microsoft.com/office/drawing/2010/main" xmlns="">
+              <a14:hiddenEffects xmlns="" xmlns:a14="http://schemas.microsoft.com/office/drawing/2010/main">
                 <a:effectLst>
                   <a:outerShdw blurRad="63500" dist="38099" dir="2700000" algn="ctr" rotWithShape="0">
                     <a:srgbClr val="000000">
@@ -23072,7 +19664,7 @@
           <a:effectLst/>
           <a:extLst>
             <a:ext uri="{909E8E84-426E-40dd-AFC4-6F175D3DCCD1}">
-              <a14:hiddenFill xmlns:a14="http://schemas.microsoft.com/office/drawing/2010/main" xmlns="">
+              <a14:hiddenFill xmlns="" xmlns:a14="http://schemas.microsoft.com/office/drawing/2010/main">
                 <a:blipFill dpi="0" rotWithShape="0">
                   <a:blip/>
                   <a:srcRect/>
@@ -23083,7 +19675,7 @@
               </a14:hiddenFill>
             </a:ext>
             <a:ext uri="{91240B29-F687-4f45-9708-019B960494DF}">
-              <a14:hiddenLine xmlns:a14="http://schemas.microsoft.com/office/drawing/2010/main" xmlns="" w="9525">
+              <a14:hiddenLine xmlns="" xmlns:a14="http://schemas.microsoft.com/office/drawing/2010/main" w="9525">
                 <a:solidFill>
                   <a:srgbClr val="000000"/>
                 </a:solidFill>
@@ -23093,7 +19685,7 @@
               </a14:hiddenLine>
             </a:ext>
             <a:ext uri="{AF507438-7753-43e0-B8FC-AC1667EBCBE1}">
-              <a14:hiddenEffects xmlns:a14="http://schemas.microsoft.com/office/drawing/2010/main" xmlns="">
+              <a14:hiddenEffects xmlns="" xmlns:a14="http://schemas.microsoft.com/office/drawing/2010/main">
                 <a:effectLst>
                   <a:outerShdw blurRad="63500" dist="38099" dir="2700000" algn="ctr" rotWithShape="0">
                     <a:srgbClr val="000000">
@@ -23178,7 +19770,7 @@
           <a:effectLst/>
           <a:extLst>
             <a:ext uri="{909E8E84-426E-40dd-AFC4-6F175D3DCCD1}">
-              <a14:hiddenFill xmlns:a14="http://schemas.microsoft.com/office/drawing/2010/main" xmlns="">
+              <a14:hiddenFill xmlns="" xmlns:a14="http://schemas.microsoft.com/office/drawing/2010/main">
                 <a:blipFill dpi="0" rotWithShape="0">
                   <a:blip/>
                   <a:srcRect/>
@@ -23189,7 +19781,7 @@
               </a14:hiddenFill>
             </a:ext>
             <a:ext uri="{91240B29-F687-4f45-9708-019B960494DF}">
-              <a14:hiddenLine xmlns:a14="http://schemas.microsoft.com/office/drawing/2010/main" xmlns="" w="9525">
+              <a14:hiddenLine xmlns="" xmlns:a14="http://schemas.microsoft.com/office/drawing/2010/main" w="9525">
                 <a:solidFill>
                   <a:srgbClr val="000000"/>
                 </a:solidFill>
@@ -23199,7 +19791,7 @@
               </a14:hiddenLine>
             </a:ext>
             <a:ext uri="{AF507438-7753-43e0-B8FC-AC1667EBCBE1}">
-              <a14:hiddenEffects xmlns:a14="http://schemas.microsoft.com/office/drawing/2010/main" xmlns="">
+              <a14:hiddenEffects xmlns="" xmlns:a14="http://schemas.microsoft.com/office/drawing/2010/main">
                 <a:effectLst>
                   <a:outerShdw blurRad="63500" dist="38099" dir="2700000" algn="ctr" rotWithShape="0">
                     <a:srgbClr val="000000">
@@ -23284,7 +19876,7 @@
           <a:effectLst/>
           <a:extLst>
             <a:ext uri="{909E8E84-426E-40dd-AFC4-6F175D3DCCD1}">
-              <a14:hiddenFill xmlns:a14="http://schemas.microsoft.com/office/drawing/2010/main" xmlns="">
+              <a14:hiddenFill xmlns="" xmlns:a14="http://schemas.microsoft.com/office/drawing/2010/main">
                 <a:blipFill dpi="0" rotWithShape="0">
                   <a:blip/>
                   <a:srcRect/>
@@ -23295,7 +19887,7 @@
               </a14:hiddenFill>
             </a:ext>
             <a:ext uri="{91240B29-F687-4f45-9708-019B960494DF}">
-              <a14:hiddenLine xmlns:a14="http://schemas.microsoft.com/office/drawing/2010/main" xmlns="" w="9525">
+              <a14:hiddenLine xmlns="" xmlns:a14="http://schemas.microsoft.com/office/drawing/2010/main" w="9525">
                 <a:solidFill>
                   <a:srgbClr val="000000"/>
                 </a:solidFill>
@@ -23305,7 +19897,7 @@
               </a14:hiddenLine>
             </a:ext>
             <a:ext uri="{AF507438-7753-43e0-B8FC-AC1667EBCBE1}">
-              <a14:hiddenEffects xmlns:a14="http://schemas.microsoft.com/office/drawing/2010/main" xmlns="">
+              <a14:hiddenEffects xmlns="" xmlns:a14="http://schemas.microsoft.com/office/drawing/2010/main">
                 <a:effectLst>
                   <a:outerShdw blurRad="63500" dist="38099" dir="2700000" algn="ctr" rotWithShape="0">
                     <a:srgbClr val="000000">
@@ -23658,7 +20250,7 @@
               <a:effectLst/>
               <a:extLst>
                 <a:ext uri="{909E8E84-426E-40dd-AFC4-6F175D3DCCD1}">
-                  <a14:hiddenFill xmlns:a14="http://schemas.microsoft.com/office/drawing/2010/main" xmlns="">
+                  <a14:hiddenFill xmlns="" xmlns:a14="http://schemas.microsoft.com/office/drawing/2010/main">
                     <a:blipFill dpi="0" rotWithShape="0">
                       <a:blip/>
                       <a:srcRect/>
@@ -23669,7 +20261,7 @@
                   </a14:hiddenFill>
                 </a:ext>
                 <a:ext uri="{91240B29-F687-4f45-9708-019B960494DF}">
-                  <a14:hiddenLine xmlns:a14="http://schemas.microsoft.com/office/drawing/2010/main" xmlns="" w="9525">
+                  <a14:hiddenLine xmlns="" xmlns:a14="http://schemas.microsoft.com/office/drawing/2010/main" w="9525">
                     <a:solidFill>
                       <a:srgbClr val="000000"/>
                     </a:solidFill>
@@ -23679,7 +20271,7 @@
                   </a14:hiddenLine>
                 </a:ext>
                 <a:ext uri="{AF507438-7753-43e0-B8FC-AC1667EBCBE1}">
-                  <a14:hiddenEffects xmlns:a14="http://schemas.microsoft.com/office/drawing/2010/main" xmlns="">
+                  <a14:hiddenEffects xmlns="" xmlns:a14="http://schemas.microsoft.com/office/drawing/2010/main">
                     <a:effectLst>
                       <a:outerShdw blurRad="63500" dist="38099" dir="2700000" algn="ctr" rotWithShape="0">
                         <a:srgbClr val="000000">
@@ -23785,7 +20377,7 @@
               <a:effectLst/>
               <a:extLst>
                 <a:ext uri="{909E8E84-426E-40dd-AFC4-6F175D3DCCD1}">
-                  <a14:hiddenFill xmlns:a14="http://schemas.microsoft.com/office/drawing/2010/main" xmlns="">
+                  <a14:hiddenFill xmlns="" xmlns:a14="http://schemas.microsoft.com/office/drawing/2010/main">
                     <a:blipFill dpi="0" rotWithShape="0">
                       <a:blip/>
                       <a:srcRect/>
@@ -23796,7 +20388,7 @@
                   </a14:hiddenFill>
                 </a:ext>
                 <a:ext uri="{91240B29-F687-4f45-9708-019B960494DF}">
-                  <a14:hiddenLine xmlns:a14="http://schemas.microsoft.com/office/drawing/2010/main" xmlns="" w="9525">
+                  <a14:hiddenLine xmlns="" xmlns:a14="http://schemas.microsoft.com/office/drawing/2010/main" w="9525">
                     <a:solidFill>
                       <a:srgbClr val="000000"/>
                     </a:solidFill>
@@ -23806,7 +20398,7 @@
                   </a14:hiddenLine>
                 </a:ext>
                 <a:ext uri="{AF507438-7753-43e0-B8FC-AC1667EBCBE1}">
-                  <a14:hiddenEffects xmlns:a14="http://schemas.microsoft.com/office/drawing/2010/main" xmlns="">
+                  <a14:hiddenEffects xmlns="" xmlns:a14="http://schemas.microsoft.com/office/drawing/2010/main">
                     <a:effectLst>
                       <a:outerShdw blurRad="63500" dist="38099" dir="2700000" algn="ctr" rotWithShape="0">
                         <a:srgbClr val="000000">
@@ -23912,7 +20504,7 @@
               <a:effectLst/>
               <a:extLst>
                 <a:ext uri="{909E8E84-426E-40dd-AFC4-6F175D3DCCD1}">
-                  <a14:hiddenFill xmlns:a14="http://schemas.microsoft.com/office/drawing/2010/main" xmlns="">
+                  <a14:hiddenFill xmlns="" xmlns:a14="http://schemas.microsoft.com/office/drawing/2010/main">
                     <a:blipFill dpi="0" rotWithShape="0">
                       <a:blip/>
                       <a:srcRect/>
@@ -23923,7 +20515,7 @@
                   </a14:hiddenFill>
                 </a:ext>
                 <a:ext uri="{91240B29-F687-4f45-9708-019B960494DF}">
-                  <a14:hiddenLine xmlns:a14="http://schemas.microsoft.com/office/drawing/2010/main" xmlns="" w="9525">
+                  <a14:hiddenLine xmlns="" xmlns:a14="http://schemas.microsoft.com/office/drawing/2010/main" w="9525">
                     <a:solidFill>
                       <a:srgbClr val="000000"/>
                     </a:solidFill>
@@ -23933,7 +20525,7 @@
                   </a14:hiddenLine>
                 </a:ext>
                 <a:ext uri="{AF507438-7753-43e0-B8FC-AC1667EBCBE1}">
-                  <a14:hiddenEffects xmlns:a14="http://schemas.microsoft.com/office/drawing/2010/main" xmlns="">
+                  <a14:hiddenEffects xmlns="" xmlns:a14="http://schemas.microsoft.com/office/drawing/2010/main">
                     <a:effectLst>
                       <a:outerShdw blurRad="63500" dist="38099" dir="2700000" algn="ctr" rotWithShape="0">
                         <a:srgbClr val="000000">
@@ -26116,7 +22708,7 @@
           <a:effectLst/>
           <a:extLst>
             <a:ext uri="{909E8E84-426E-40dd-AFC4-6F175D3DCCD1}">
-              <a14:hiddenFill xmlns:a14="http://schemas.microsoft.com/office/drawing/2010/main" xmlns="">
+              <a14:hiddenFill xmlns="" xmlns:a14="http://schemas.microsoft.com/office/drawing/2010/main">
                 <a:blipFill dpi="0" rotWithShape="0">
                   <a:blip/>
                   <a:srcRect/>
@@ -26127,7 +22719,7 @@
               </a14:hiddenFill>
             </a:ext>
             <a:ext uri="{91240B29-F687-4f45-9708-019B960494DF}">
-              <a14:hiddenLine xmlns:a14="http://schemas.microsoft.com/office/drawing/2010/main" xmlns="" w="9525">
+              <a14:hiddenLine xmlns="" xmlns:a14="http://schemas.microsoft.com/office/drawing/2010/main" w="9525">
                 <a:solidFill>
                   <a:srgbClr val="000000"/>
                 </a:solidFill>
@@ -26137,7 +22729,7 @@
               </a14:hiddenLine>
             </a:ext>
             <a:ext uri="{AF507438-7753-43e0-B8FC-AC1667EBCBE1}">
-              <a14:hiddenEffects xmlns:a14="http://schemas.microsoft.com/office/drawing/2010/main" xmlns="">
+              <a14:hiddenEffects xmlns="" xmlns:a14="http://schemas.microsoft.com/office/drawing/2010/main">
                 <a:effectLst>
                   <a:outerShdw blurRad="63500" dist="38099" dir="2700000" algn="ctr" rotWithShape="0">
                     <a:srgbClr val="000000">
@@ -26519,7 +23111,7 @@
             <a:effectLst/>
             <a:extLst>
               <a:ext uri="{909E8E84-426E-40dd-AFC4-6F175D3DCCD1}">
-                <a14:hiddenFill xmlns:a14="http://schemas.microsoft.com/office/drawing/2010/main" xmlns="">
+                <a14:hiddenFill xmlns="" xmlns:a14="http://schemas.microsoft.com/office/drawing/2010/main">
                   <a:blipFill dpi="0" rotWithShape="0">
                     <a:blip/>
                     <a:srcRect/>
@@ -26530,7 +23122,7 @@
                 </a14:hiddenFill>
               </a:ext>
               <a:ext uri="{91240B29-F687-4f45-9708-019B960494DF}">
-                <a14:hiddenLine xmlns:a14="http://schemas.microsoft.com/office/drawing/2010/main" xmlns="" w="9525">
+                <a14:hiddenLine xmlns="" xmlns:a14="http://schemas.microsoft.com/office/drawing/2010/main" w="9525">
                   <a:solidFill>
                     <a:srgbClr val="000000"/>
                   </a:solidFill>
@@ -26540,7 +23132,7 @@
                 </a14:hiddenLine>
               </a:ext>
               <a:ext uri="{AF507438-7753-43e0-B8FC-AC1667EBCBE1}">
-                <a14:hiddenEffects xmlns:a14="http://schemas.microsoft.com/office/drawing/2010/main" xmlns="">
+                <a14:hiddenEffects xmlns="" xmlns:a14="http://schemas.microsoft.com/office/drawing/2010/main">
                   <a:effectLst>
                     <a:outerShdw blurRad="63500" dist="38099" dir="2700000" algn="ctr" rotWithShape="0">
                       <a:srgbClr val="000000">
@@ -26595,7 +23187,7 @@
             <a:effectLst/>
             <a:extLst>
               <a:ext uri="{909E8E84-426E-40dd-AFC4-6F175D3DCCD1}">
-                <a14:hiddenFill xmlns:a14="http://schemas.microsoft.com/office/drawing/2010/main" xmlns="">
+                <a14:hiddenFill xmlns="" xmlns:a14="http://schemas.microsoft.com/office/drawing/2010/main">
                   <a:blipFill dpi="0" rotWithShape="0">
                     <a:blip/>
                     <a:srcRect/>
@@ -26606,7 +23198,7 @@
                 </a14:hiddenFill>
               </a:ext>
               <a:ext uri="{91240B29-F687-4f45-9708-019B960494DF}">
-                <a14:hiddenLine xmlns:a14="http://schemas.microsoft.com/office/drawing/2010/main" xmlns="" w="9525">
+                <a14:hiddenLine xmlns="" xmlns:a14="http://schemas.microsoft.com/office/drawing/2010/main" w="9525">
                   <a:solidFill>
                     <a:srgbClr val="000000"/>
                   </a:solidFill>
@@ -26616,7 +23208,7 @@
                 </a14:hiddenLine>
               </a:ext>
               <a:ext uri="{AF507438-7753-43e0-B8FC-AC1667EBCBE1}">
-                <a14:hiddenEffects xmlns:a14="http://schemas.microsoft.com/office/drawing/2010/main" xmlns="">
+                <a14:hiddenEffects xmlns="" xmlns:a14="http://schemas.microsoft.com/office/drawing/2010/main">
                   <a:effectLst>
                     <a:outerShdw blurRad="63500" dist="38099" dir="2700000" algn="ctr" rotWithShape="0">
                       <a:srgbClr val="000000">
@@ -26671,7 +23263,7 @@
             <a:effectLst/>
             <a:extLst>
               <a:ext uri="{909E8E84-426E-40dd-AFC4-6F175D3DCCD1}">
-                <a14:hiddenFill xmlns:a14="http://schemas.microsoft.com/office/drawing/2010/main" xmlns="">
+                <a14:hiddenFill xmlns="" xmlns:a14="http://schemas.microsoft.com/office/drawing/2010/main">
                   <a:blipFill dpi="0" rotWithShape="0">
                     <a:blip/>
                     <a:srcRect/>
@@ -26682,7 +23274,7 @@
                 </a14:hiddenFill>
               </a:ext>
               <a:ext uri="{91240B29-F687-4f45-9708-019B960494DF}">
-                <a14:hiddenLine xmlns:a14="http://schemas.microsoft.com/office/drawing/2010/main" xmlns="" w="9525">
+                <a14:hiddenLine xmlns="" xmlns:a14="http://schemas.microsoft.com/office/drawing/2010/main" w="9525">
                   <a:solidFill>
                     <a:srgbClr val="000000"/>
                   </a:solidFill>
@@ -26692,7 +23284,7 @@
                 </a14:hiddenLine>
               </a:ext>
               <a:ext uri="{AF507438-7753-43e0-B8FC-AC1667EBCBE1}">
-                <a14:hiddenEffects xmlns:a14="http://schemas.microsoft.com/office/drawing/2010/main" xmlns="">
+                <a14:hiddenEffects xmlns="" xmlns:a14="http://schemas.microsoft.com/office/drawing/2010/main">
                   <a:effectLst>
                     <a:outerShdw blurRad="63500" dist="38099" dir="2700000" algn="ctr" rotWithShape="0">
                       <a:srgbClr val="000000">
@@ -26747,7 +23339,7 @@
             <a:effectLst/>
             <a:extLst>
               <a:ext uri="{909E8E84-426E-40dd-AFC4-6F175D3DCCD1}">
-                <a14:hiddenFill xmlns:a14="http://schemas.microsoft.com/office/drawing/2010/main" xmlns="">
+                <a14:hiddenFill xmlns="" xmlns:a14="http://schemas.microsoft.com/office/drawing/2010/main">
                   <a:blipFill dpi="0" rotWithShape="0">
                     <a:blip/>
                     <a:srcRect/>
@@ -26758,7 +23350,7 @@
                 </a14:hiddenFill>
               </a:ext>
               <a:ext uri="{91240B29-F687-4f45-9708-019B960494DF}">
-                <a14:hiddenLine xmlns:a14="http://schemas.microsoft.com/office/drawing/2010/main" xmlns="" w="9525">
+                <a14:hiddenLine xmlns="" xmlns:a14="http://schemas.microsoft.com/office/drawing/2010/main" w="9525">
                   <a:solidFill>
                     <a:srgbClr val="000000"/>
                   </a:solidFill>
@@ -26768,7 +23360,7 @@
                 </a14:hiddenLine>
               </a:ext>
               <a:ext uri="{AF507438-7753-43e0-B8FC-AC1667EBCBE1}">
-                <a14:hiddenEffects xmlns:a14="http://schemas.microsoft.com/office/drawing/2010/main" xmlns="">
+                <a14:hiddenEffects xmlns="" xmlns:a14="http://schemas.microsoft.com/office/drawing/2010/main">
                   <a:effectLst>
                     <a:outerShdw blurRad="63500" dist="38099" dir="2700000" algn="ctr" rotWithShape="0">
                       <a:srgbClr val="000000">
@@ -26916,7 +23508,7 @@
             <a:effectLst/>
             <a:extLst>
               <a:ext uri="{909E8E84-426E-40dd-AFC4-6F175D3DCCD1}">
-                <a14:hiddenFill xmlns:a14="http://schemas.microsoft.com/office/drawing/2010/main" xmlns="">
+                <a14:hiddenFill xmlns="" xmlns:a14="http://schemas.microsoft.com/office/drawing/2010/main">
                   <a:blipFill dpi="0" rotWithShape="0">
                     <a:blip/>
                     <a:srcRect/>
@@ -26927,7 +23519,7 @@
                 </a14:hiddenFill>
               </a:ext>
               <a:ext uri="{91240B29-F687-4f45-9708-019B960494DF}">
-                <a14:hiddenLine xmlns:a14="http://schemas.microsoft.com/office/drawing/2010/main" xmlns="" w="9525">
+                <a14:hiddenLine xmlns="" xmlns:a14="http://schemas.microsoft.com/office/drawing/2010/main" w="9525">
                   <a:solidFill>
                     <a:srgbClr val="000000"/>
                   </a:solidFill>
@@ -26937,7 +23529,7 @@
                 </a14:hiddenLine>
               </a:ext>
               <a:ext uri="{AF507438-7753-43e0-B8FC-AC1667EBCBE1}">
-                <a14:hiddenEffects xmlns:a14="http://schemas.microsoft.com/office/drawing/2010/main" xmlns="">
+                <a14:hiddenEffects xmlns="" xmlns:a14="http://schemas.microsoft.com/office/drawing/2010/main">
                   <a:effectLst>
                     <a:outerShdw blurRad="63500" dist="38099" dir="2700000" algn="ctr" rotWithShape="0">
                       <a:srgbClr val="000000">
@@ -26992,7 +23584,7 @@
             <a:effectLst/>
             <a:extLst>
               <a:ext uri="{909E8E84-426E-40dd-AFC4-6F175D3DCCD1}">
-                <a14:hiddenFill xmlns:a14="http://schemas.microsoft.com/office/drawing/2010/main" xmlns="">
+                <a14:hiddenFill xmlns="" xmlns:a14="http://schemas.microsoft.com/office/drawing/2010/main">
                   <a:blipFill dpi="0" rotWithShape="0">
                     <a:blip/>
                     <a:srcRect/>
@@ -27003,7 +23595,7 @@
                 </a14:hiddenFill>
               </a:ext>
               <a:ext uri="{91240B29-F687-4f45-9708-019B960494DF}">
-                <a14:hiddenLine xmlns:a14="http://schemas.microsoft.com/office/drawing/2010/main" xmlns="" w="9525">
+                <a14:hiddenLine xmlns="" xmlns:a14="http://schemas.microsoft.com/office/drawing/2010/main" w="9525">
                   <a:solidFill>
                     <a:srgbClr val="000000"/>
                   </a:solidFill>
@@ -27013,7 +23605,7 @@
                 </a14:hiddenLine>
               </a:ext>
               <a:ext uri="{AF507438-7753-43e0-B8FC-AC1667EBCBE1}">
-                <a14:hiddenEffects xmlns:a14="http://schemas.microsoft.com/office/drawing/2010/main" xmlns="">
+                <a14:hiddenEffects xmlns="" xmlns:a14="http://schemas.microsoft.com/office/drawing/2010/main">
                   <a:effectLst>
                     <a:outerShdw blurRad="63500" dist="38099" dir="2700000" algn="ctr" rotWithShape="0">
                       <a:srgbClr val="000000">
@@ -27068,7 +23660,7 @@
             <a:effectLst/>
             <a:extLst>
               <a:ext uri="{909E8E84-426E-40dd-AFC4-6F175D3DCCD1}">
-                <a14:hiddenFill xmlns:a14="http://schemas.microsoft.com/office/drawing/2010/main" xmlns="">
+                <a14:hiddenFill xmlns="" xmlns:a14="http://schemas.microsoft.com/office/drawing/2010/main">
                   <a:blipFill dpi="0" rotWithShape="0">
                     <a:blip/>
                     <a:srcRect/>
@@ -27079,7 +23671,7 @@
                 </a14:hiddenFill>
               </a:ext>
               <a:ext uri="{91240B29-F687-4f45-9708-019B960494DF}">
-                <a14:hiddenLine xmlns:a14="http://schemas.microsoft.com/office/drawing/2010/main" xmlns="" w="9525">
+                <a14:hiddenLine xmlns="" xmlns:a14="http://schemas.microsoft.com/office/drawing/2010/main" w="9525">
                   <a:solidFill>
                     <a:srgbClr val="000000"/>
                   </a:solidFill>
@@ -27089,7 +23681,7 @@
                 </a14:hiddenLine>
               </a:ext>
               <a:ext uri="{AF507438-7753-43e0-B8FC-AC1667EBCBE1}">
-                <a14:hiddenEffects xmlns:a14="http://schemas.microsoft.com/office/drawing/2010/main" xmlns="">
+                <a14:hiddenEffects xmlns="" xmlns:a14="http://schemas.microsoft.com/office/drawing/2010/main">
                   <a:effectLst>
                     <a:outerShdw blurRad="63500" dist="38099" dir="2700000" algn="ctr" rotWithShape="0">
                       <a:srgbClr val="000000">
@@ -27144,7 +23736,7 @@
             <a:effectLst/>
             <a:extLst>
               <a:ext uri="{909E8E84-426E-40dd-AFC4-6F175D3DCCD1}">
-                <a14:hiddenFill xmlns:a14="http://schemas.microsoft.com/office/drawing/2010/main" xmlns="">
+                <a14:hiddenFill xmlns="" xmlns:a14="http://schemas.microsoft.com/office/drawing/2010/main">
                   <a:blipFill dpi="0" rotWithShape="0">
                     <a:blip/>
                     <a:srcRect/>
@@ -27155,7 +23747,7 @@
                 </a14:hiddenFill>
               </a:ext>
               <a:ext uri="{91240B29-F687-4f45-9708-019B960494DF}">
-                <a14:hiddenLine xmlns:a14="http://schemas.microsoft.com/office/drawing/2010/main" xmlns="" w="9525">
+                <a14:hiddenLine xmlns="" xmlns:a14="http://schemas.microsoft.com/office/drawing/2010/main" w="9525">
                   <a:solidFill>
                     <a:srgbClr val="000000"/>
                   </a:solidFill>
@@ -27165,7 +23757,7 @@
                 </a14:hiddenLine>
               </a:ext>
               <a:ext uri="{AF507438-7753-43e0-B8FC-AC1667EBCBE1}">
-                <a14:hiddenEffects xmlns:a14="http://schemas.microsoft.com/office/drawing/2010/main" xmlns="">
+                <a14:hiddenEffects xmlns="" xmlns:a14="http://schemas.microsoft.com/office/drawing/2010/main">
                   <a:effectLst>
                     <a:outerShdw blurRad="63500" dist="38099" dir="2700000" algn="ctr" rotWithShape="0">
                       <a:srgbClr val="000000">
@@ -27383,7 +23975,7 @@
           <a:effectLst/>
           <a:extLst>
             <a:ext uri="{909E8E84-426E-40dd-AFC4-6F175D3DCCD1}">
-              <a14:hiddenFill xmlns:a14="http://schemas.microsoft.com/office/drawing/2010/main" xmlns="">
+              <a14:hiddenFill xmlns="" xmlns:a14="http://schemas.microsoft.com/office/drawing/2010/main">
                 <a:blipFill dpi="0" rotWithShape="0">
                   <a:blip/>
                   <a:srcRect/>
@@ -27394,7 +23986,7 @@
               </a14:hiddenFill>
             </a:ext>
             <a:ext uri="{91240B29-F687-4f45-9708-019B960494DF}">
-              <a14:hiddenLine xmlns:a14="http://schemas.microsoft.com/office/drawing/2010/main" xmlns="" w="9525">
+              <a14:hiddenLine xmlns="" xmlns:a14="http://schemas.microsoft.com/office/drawing/2010/main" w="9525">
                 <a:solidFill>
                   <a:srgbClr val="000000"/>
                 </a:solidFill>
@@ -27404,7 +23996,7 @@
               </a14:hiddenLine>
             </a:ext>
             <a:ext uri="{AF507438-7753-43e0-B8FC-AC1667EBCBE1}">
-              <a14:hiddenEffects xmlns:a14="http://schemas.microsoft.com/office/drawing/2010/main" xmlns="">
+              <a14:hiddenEffects xmlns="" xmlns:a14="http://schemas.microsoft.com/office/drawing/2010/main">
                 <a:effectLst>
                   <a:outerShdw blurRad="63500" dist="38099" dir="2700000" algn="ctr" rotWithShape="0">
                     <a:srgbClr val="000000">
@@ -27568,7 +24160,7 @@
             <a:effectLst/>
             <a:extLst>
               <a:ext uri="{909E8E84-426E-40dd-AFC4-6F175D3DCCD1}">
-                <a14:hiddenFill xmlns:a14="http://schemas.microsoft.com/office/drawing/2010/main" xmlns="">
+                <a14:hiddenFill xmlns="" xmlns:a14="http://schemas.microsoft.com/office/drawing/2010/main">
                   <a:blipFill dpi="0" rotWithShape="0">
                     <a:blip/>
                     <a:srcRect/>
@@ -27579,7 +24171,7 @@
                 </a14:hiddenFill>
               </a:ext>
               <a:ext uri="{91240B29-F687-4f45-9708-019B960494DF}">
-                <a14:hiddenLine xmlns:a14="http://schemas.microsoft.com/office/drawing/2010/main" xmlns="" w="9525">
+                <a14:hiddenLine xmlns="" xmlns:a14="http://schemas.microsoft.com/office/drawing/2010/main" w="9525">
                   <a:solidFill>
                     <a:srgbClr val="000000"/>
                   </a:solidFill>
@@ -27589,7 +24181,7 @@
                 </a14:hiddenLine>
               </a:ext>
               <a:ext uri="{AF507438-7753-43e0-B8FC-AC1667EBCBE1}">
-                <a14:hiddenEffects xmlns:a14="http://schemas.microsoft.com/office/drawing/2010/main" xmlns="">
+                <a14:hiddenEffects xmlns="" xmlns:a14="http://schemas.microsoft.com/office/drawing/2010/main">
                   <a:effectLst>
                     <a:outerShdw blurRad="63500" dist="38099" dir="2700000" algn="ctr" rotWithShape="0">
                       <a:srgbClr val="000000">
@@ -27644,7 +24236,7 @@
             <a:effectLst/>
             <a:extLst>
               <a:ext uri="{909E8E84-426E-40dd-AFC4-6F175D3DCCD1}">
-                <a14:hiddenFill xmlns:a14="http://schemas.microsoft.com/office/drawing/2010/main" xmlns="">
+                <a14:hiddenFill xmlns="" xmlns:a14="http://schemas.microsoft.com/office/drawing/2010/main">
                   <a:blipFill dpi="0" rotWithShape="0">
                     <a:blip/>
                     <a:srcRect/>
@@ -27655,7 +24247,7 @@
                 </a14:hiddenFill>
               </a:ext>
               <a:ext uri="{91240B29-F687-4f45-9708-019B960494DF}">
-                <a14:hiddenLine xmlns:a14="http://schemas.microsoft.com/office/drawing/2010/main" xmlns="" w="9525">
+                <a14:hiddenLine xmlns="" xmlns:a14="http://schemas.microsoft.com/office/drawing/2010/main" w="9525">
                   <a:solidFill>
                     <a:srgbClr val="000000"/>
                   </a:solidFill>
@@ -27665,7 +24257,7 @@
                 </a14:hiddenLine>
               </a:ext>
               <a:ext uri="{AF507438-7753-43e0-B8FC-AC1667EBCBE1}">
-                <a14:hiddenEffects xmlns:a14="http://schemas.microsoft.com/office/drawing/2010/main" xmlns="">
+                <a14:hiddenEffects xmlns="" xmlns:a14="http://schemas.microsoft.com/office/drawing/2010/main">
                   <a:effectLst>
                     <a:outerShdw blurRad="63500" dist="38099" dir="2700000" algn="ctr" rotWithShape="0">
                       <a:srgbClr val="000000">
@@ -27720,7 +24312,7 @@
             <a:effectLst/>
             <a:extLst>
               <a:ext uri="{909E8E84-426E-40dd-AFC4-6F175D3DCCD1}">
-                <a14:hiddenFill xmlns:a14="http://schemas.microsoft.com/office/drawing/2010/main" xmlns="">
+                <a14:hiddenFill xmlns="" xmlns:a14="http://schemas.microsoft.com/office/drawing/2010/main">
                   <a:blipFill dpi="0" rotWithShape="0">
                     <a:blip/>
                     <a:srcRect/>
@@ -27731,7 +24323,7 @@
                 </a14:hiddenFill>
               </a:ext>
               <a:ext uri="{91240B29-F687-4f45-9708-019B960494DF}">
-                <a14:hiddenLine xmlns:a14="http://schemas.microsoft.com/office/drawing/2010/main" xmlns="" w="9525">
+                <a14:hiddenLine xmlns="" xmlns:a14="http://schemas.microsoft.com/office/drawing/2010/main" w="9525">
                   <a:solidFill>
                     <a:srgbClr val="000000"/>
                   </a:solidFill>
@@ -27741,7 +24333,7 @@
                 </a14:hiddenLine>
               </a:ext>
               <a:ext uri="{AF507438-7753-43e0-B8FC-AC1667EBCBE1}">
-                <a14:hiddenEffects xmlns:a14="http://schemas.microsoft.com/office/drawing/2010/main" xmlns="">
+                <a14:hiddenEffects xmlns="" xmlns:a14="http://schemas.microsoft.com/office/drawing/2010/main">
                   <a:effectLst>
                     <a:outerShdw blurRad="63500" dist="38099" dir="2700000" algn="ctr" rotWithShape="0">
                       <a:srgbClr val="000000">
@@ -27796,7 +24388,7 @@
             <a:effectLst/>
             <a:extLst>
               <a:ext uri="{909E8E84-426E-40dd-AFC4-6F175D3DCCD1}">
-                <a14:hiddenFill xmlns:a14="http://schemas.microsoft.com/office/drawing/2010/main" xmlns="">
+                <a14:hiddenFill xmlns="" xmlns:a14="http://schemas.microsoft.com/office/drawing/2010/main">
                   <a:blipFill dpi="0" rotWithShape="0">
                     <a:blip/>
                     <a:srcRect/>
@@ -27807,7 +24399,7 @@
                 </a14:hiddenFill>
               </a:ext>
               <a:ext uri="{91240B29-F687-4f45-9708-019B960494DF}">
-                <a14:hiddenLine xmlns:a14="http://schemas.microsoft.com/office/drawing/2010/main" xmlns="" w="9525">
+                <a14:hiddenLine xmlns="" xmlns:a14="http://schemas.microsoft.com/office/drawing/2010/main" w="9525">
                   <a:solidFill>
                     <a:srgbClr val="000000"/>
                   </a:solidFill>
@@ -27817,7 +24409,7 @@
                 </a14:hiddenLine>
               </a:ext>
               <a:ext uri="{AF507438-7753-43e0-B8FC-AC1667EBCBE1}">
-                <a14:hiddenEffects xmlns:a14="http://schemas.microsoft.com/office/drawing/2010/main" xmlns="">
+                <a14:hiddenEffects xmlns="" xmlns:a14="http://schemas.microsoft.com/office/drawing/2010/main">
                   <a:effectLst>
                     <a:outerShdw blurRad="63500" dist="38099" dir="2700000" algn="ctr" rotWithShape="0">
                       <a:srgbClr val="000000">

</xml_diff>